<commit_message>
modificacion ppt y pdf
</commit_message>
<xml_diff>
--- a/11-PRESENTACION_TEK.pptx
+++ b/11-PRESENTACION_TEK.pptx
@@ -20,8 +20,6 @@
     <p:sldId id="265" r:id="rId17"/>
     <p:sldId id="266" r:id="rId18"/>
     <p:sldId id="267" r:id="rId19"/>
-    <p:sldId id="268" r:id="rId20"/>
-    <p:sldId id="269" r:id="rId21"/>
   </p:sldIdLst>
   <p:sldSz cx="12192000" cy="6858000"/>
   <p:notesSz cx="6858000" cy="9144000"/>
@@ -669,7 +667,7 @@
         <p:spPr>
           <a:xfrm>
             <a:off x="5183187" y="987425"/>
-            <a:ext cx="6172202" cy="4873625"/>
+            <a:ext cx="6172203" cy="4873625"/>
           </a:xfrm>
           <a:prstGeom prst="rect">
             <a:avLst/>
@@ -956,7 +954,7 @@
         <p:spPr>
           <a:xfrm rot="5400000">
             <a:off x="7133431" y="1956592"/>
-            <a:ext cx="5811840" cy="2628902"/>
+            <a:ext cx="5811841" cy="2628902"/>
           </a:xfrm>
           <a:prstGeom prst="rect">
             <a:avLst/>
@@ -1236,7 +1234,7 @@
         <p:spPr>
           <a:xfrm>
             <a:off x="381000" y="476098"/>
-            <a:ext cx="8821740" cy="507775"/>
+            <a:ext cx="8821740" cy="507776"/>
           </a:xfrm>
           <a:prstGeom prst="rect">
             <a:avLst/>
@@ -1252,25 +1250,25 @@
               <a:buNone/>
               <a:defRPr b="1" sz="3600"/>
             </a:lvl1pPr>
-            <a:lvl2pPr marL="1104900" indent="-571500">
+            <a:lvl2pPr marL="1333500" indent="-571500">
               <a:buClrTx/>
               <a:buSzPts val="3600"/>
               <a:buFontTx/>
               <a:defRPr b="1" sz="3600"/>
             </a:lvl2pPr>
-            <a:lvl3pPr marL="1656078" indent="-640078">
+            <a:lvl3pPr marL="1884677" indent="-640077">
               <a:buClrTx/>
               <a:buSzPts val="3600"/>
               <a:buFontTx/>
               <a:defRPr b="1" sz="3600"/>
             </a:lvl3pPr>
-            <a:lvl4pPr marL="2171700" indent="-685800">
+            <a:lvl4pPr marL="2400300" indent="-685800">
               <a:buClrTx/>
               <a:buSzPts val="3600"/>
               <a:buFontTx/>
               <a:defRPr b="1" sz="3600"/>
             </a:lvl4pPr>
-            <a:lvl5pPr marL="2628900" indent="-685800">
+            <a:lvl5pPr marL="2857500" indent="-685800">
               <a:buClrTx/>
               <a:buSzPts val="3600"/>
               <a:buFontTx/>
@@ -1320,7 +1318,7 @@
         <p:spPr>
           <a:xfrm>
             <a:off x="381000" y="983869"/>
-            <a:ext cx="6745288" cy="424809"/>
+            <a:ext cx="6745288" cy="424810"/>
           </a:xfrm>
           <a:prstGeom prst="rect">
             <a:avLst/>
@@ -1330,7 +1328,7 @@
           <a:bodyPr lIns="0" tIns="0" rIns="0" bIns="0"/>
           <a:lstStyle/>
           <a:p>
-            <a:pPr indent="-406400"/>
+            <a:pPr/>
           </a:p>
         </p:txBody>
       </p:sp>
@@ -1469,7 +1467,7 @@
               <a:buFontTx/>
               <a:buNone/>
             </a:lvl1pPr>
-            <a:lvl2pPr marL="977900" indent="-444500" algn="ctr">
+            <a:lvl2pPr marL="1206500" indent="-444500" algn="ctr">
               <a:lnSpc>
                 <a:spcPct val="100000"/>
               </a:lnSpc>
@@ -1479,7 +1477,7 @@
               <a:buClrTx/>
               <a:buFontTx/>
             </a:lvl2pPr>
-            <a:lvl3pPr marL="1513838" indent="-497838" algn="ctr">
+            <a:lvl3pPr marL="1742438" indent="-497838" algn="ctr">
               <a:lnSpc>
                 <a:spcPct val="100000"/>
               </a:lnSpc>
@@ -1489,7 +1487,7 @@
               <a:buClrTx/>
               <a:buFontTx/>
             </a:lvl3pPr>
-            <a:lvl4pPr algn="ctr">
+            <a:lvl4pPr marL="2247900" algn="ctr">
               <a:lnSpc>
                 <a:spcPct val="100000"/>
               </a:lnSpc>
@@ -1499,7 +1497,7 @@
               <a:buClrTx/>
               <a:buFontTx/>
             </a:lvl4pPr>
-            <a:lvl5pPr algn="ctr">
+            <a:lvl5pPr marL="2705100" algn="ctr">
               <a:lnSpc>
                 <a:spcPct val="100000"/>
               </a:lnSpc>
@@ -1680,7 +1678,7 @@
               <a:buFontTx/>
               <a:buNone/>
             </a:lvl1pPr>
-            <a:lvl2pPr marL="977900" indent="-444500" algn="ctr">
+            <a:lvl2pPr marL="1206500" indent="-444500" algn="ctr">
               <a:lnSpc>
                 <a:spcPct val="100000"/>
               </a:lnSpc>
@@ -1690,7 +1688,7 @@
               <a:buClrTx/>
               <a:buFontTx/>
             </a:lvl2pPr>
-            <a:lvl3pPr marL="1513838" indent="-497838" algn="ctr">
+            <a:lvl3pPr marL="1742438" indent="-497838" algn="ctr">
               <a:lnSpc>
                 <a:spcPct val="100000"/>
               </a:lnSpc>
@@ -1700,7 +1698,7 @@
               <a:buClrTx/>
               <a:buFontTx/>
             </a:lvl3pPr>
-            <a:lvl4pPr algn="ctr">
+            <a:lvl4pPr marL="2247900" algn="ctr">
               <a:lnSpc>
                 <a:spcPct val="100000"/>
               </a:lnSpc>
@@ -1710,7 +1708,7 @@
               <a:buClrTx/>
               <a:buFontTx/>
             </a:lvl4pPr>
-            <a:lvl5pPr algn="ctr">
+            <a:lvl5pPr marL="2705100" algn="ctr">
               <a:lnSpc>
                 <a:spcPct val="100000"/>
               </a:lnSpc>
@@ -1832,7 +1830,7 @@
         <p:spPr>
           <a:xfrm flipH="1">
             <a:off x="8026400" y="2887578"/>
-            <a:ext cx="4165600" cy="2935900"/>
+            <a:ext cx="4165600" cy="2935901"/>
           </a:xfrm>
           <a:prstGeom prst="rect">
             <a:avLst/>
@@ -2034,7 +2032,7 @@
         <p:spPr>
           <a:xfrm>
             <a:off x="1524000" y="3602037"/>
-            <a:ext cx="9144000" cy="1655764"/>
+            <a:ext cx="9144000" cy="1655765"/>
           </a:xfrm>
           <a:prstGeom prst="rect">
             <a:avLst/>
@@ -2043,35 +2041,35 @@
         <p:txBody>
           <a:bodyPr/>
           <a:lstStyle>
-            <a:lvl1pPr marL="355600" indent="-304800" algn="ctr">
+            <a:lvl1pPr marL="304800" indent="-254000" algn="ctr">
               <a:buClrTx/>
               <a:buSzTx/>
               <a:buFontTx/>
               <a:buNone/>
               <a:defRPr sz="2400"/>
             </a:lvl1pPr>
-            <a:lvl2pPr marL="355600" indent="50800" algn="ctr">
+            <a:lvl2pPr marL="304800" indent="50800" algn="ctr">
               <a:buClrTx/>
               <a:buSzTx/>
               <a:buFontTx/>
               <a:buNone/>
               <a:defRPr sz="2400"/>
             </a:lvl2pPr>
-            <a:lvl3pPr marL="355600" indent="50800" algn="ctr">
+            <a:lvl3pPr marL="304800" indent="50800" algn="ctr">
               <a:buClrTx/>
               <a:buSzTx/>
               <a:buFontTx/>
               <a:buNone/>
               <a:defRPr sz="2400"/>
             </a:lvl3pPr>
-            <a:lvl4pPr marL="355600" indent="50800" algn="ctr">
+            <a:lvl4pPr marL="304800" indent="50800" algn="ctr">
               <a:buClrTx/>
               <a:buSzTx/>
               <a:buFontTx/>
               <a:buNone/>
               <a:defRPr sz="2400"/>
             </a:lvl4pPr>
-            <a:lvl5pPr marL="355600" indent="50800" algn="ctr">
+            <a:lvl5pPr marL="304800" indent="50800" algn="ctr">
               <a:buClrTx/>
               <a:buSzTx/>
               <a:buFontTx/>
@@ -2531,7 +2529,7 @@
         <p:spPr>
           <a:xfrm>
             <a:off x="831850" y="4589462"/>
-            <a:ext cx="10515600" cy="1500189"/>
+            <a:ext cx="10515600" cy="1500190"/>
           </a:xfrm>
           <a:prstGeom prst="rect">
             <a:avLst/>
@@ -2773,7 +2771,7 @@
           <a:bodyPr/>
           <a:lstStyle/>
           <a:p>
-            <a:pPr indent="-406400"/>
+            <a:pPr/>
           </a:p>
         </p:txBody>
       </p:sp>
@@ -2864,7 +2862,7 @@
         <p:spPr>
           <a:xfrm>
             <a:off x="839787" y="1681163"/>
-            <a:ext cx="5157790" cy="823914"/>
+            <a:ext cx="5157790" cy="823915"/>
           </a:xfrm>
           <a:prstGeom prst="rect">
             <a:avLst/>
@@ -2952,7 +2950,7 @@
         <p:spPr>
           <a:xfrm>
             <a:off x="839786" y="2505075"/>
-            <a:ext cx="5157791" cy="3684588"/>
+            <a:ext cx="5157792" cy="3684588"/>
           </a:xfrm>
           <a:prstGeom prst="rect">
             <a:avLst/>
@@ -2962,7 +2960,7 @@
           <a:bodyPr/>
           <a:lstStyle/>
           <a:p>
-            <a:pPr indent="-406400"/>
+            <a:pPr/>
           </a:p>
         </p:txBody>
       </p:sp>
@@ -2987,7 +2985,7 @@
           <a:bodyPr anchor="b"/>
           <a:lstStyle/>
           <a:p>
-            <a:pPr indent="-406400"/>
+            <a:pPr/>
           </a:p>
         </p:txBody>
       </p:sp>
@@ -3012,7 +3010,7 @@
           <a:bodyPr/>
           <a:lstStyle/>
           <a:p>
-            <a:pPr indent="-406400"/>
+            <a:pPr/>
           </a:p>
         </p:txBody>
       </p:sp>
@@ -3227,7 +3225,7 @@
         <p:spPr>
           <a:xfrm>
             <a:off x="5183187" y="987425"/>
-            <a:ext cx="6172202" cy="4873625"/>
+            <a:ext cx="6172203" cy="4873625"/>
           </a:xfrm>
           <a:prstGeom prst="rect">
             <a:avLst/>
@@ -3300,7 +3298,7 @@
         <p:spPr>
           <a:xfrm>
             <a:off x="839786" y="2057400"/>
-            <a:ext cx="3932241" cy="3811588"/>
+            <a:ext cx="3932242" cy="3811588"/>
           </a:xfrm>
           <a:prstGeom prst="rect">
             <a:avLst/>
@@ -3310,7 +3308,7 @@
           <a:bodyPr/>
           <a:lstStyle/>
           <a:p>
-            <a:pPr indent="-406400"/>
+            <a:pPr/>
           </a:p>
         </p:txBody>
       </p:sp>
@@ -3479,8 +3477,8 @@
         </p:nvSpPr>
         <p:spPr>
           <a:xfrm>
-            <a:off x="11080186" y="6406806"/>
-            <a:ext cx="273615" cy="264213"/>
+            <a:off x="11080187" y="6406806"/>
+            <a:ext cx="273614" cy="264213"/>
           </a:xfrm>
           <a:prstGeom prst="rect">
             <a:avLst/>
@@ -4292,7 +4290,7 @@
         </p:nvSpPr>
         <p:spPr>
           <a:xfrm>
-            <a:off x="1503485" y="1208247"/>
+            <a:off x="1503485" y="1208246"/>
             <a:ext cx="11227776" cy="2263424"/>
           </a:xfrm>
           <a:prstGeom prst="rect">
@@ -4356,7 +4354,7 @@
         <p:spPr>
           <a:xfrm>
             <a:off x="1503484" y="3813702"/>
-            <a:ext cx="8947640" cy="419337"/>
+            <a:ext cx="8947640" cy="419336"/>
           </a:xfrm>
           <a:prstGeom prst="rect">
             <a:avLst/>
@@ -4406,7 +4404,7 @@
         <p:spPr>
           <a:xfrm>
             <a:off x="7447084" y="5418166"/>
-            <a:ext cx="3004039" cy="407052"/>
+            <a:ext cx="3004040" cy="407052"/>
           </a:xfrm>
           <a:prstGeom prst="rect">
             <a:avLst/>
@@ -4448,8 +4446,8 @@
         </p:nvSpPr>
         <p:spPr>
           <a:xfrm>
-            <a:off x="729761" y="4800600"/>
-            <a:ext cx="10568354" cy="0"/>
+            <a:off x="729760" y="4800600"/>
+            <a:ext cx="10568356" cy="0"/>
           </a:xfrm>
           <a:prstGeom prst="line">
             <a:avLst/>
@@ -4496,7 +4494,65 @@
       </p:grpSpPr>
       <p:sp>
         <p:nvSpPr>
-          <p:cNvPr id="272" name="Google Shape;232;p33"/>
+          <p:cNvPr id="274" name="Google Shape;246;p34"/>
+          <p:cNvSpPr txBox="1"/>
+          <p:nvPr/>
+        </p:nvSpPr>
+        <p:spPr>
+          <a:xfrm>
+            <a:off x="570521" y="1807591"/>
+            <a:ext cx="2884825" cy="4098783"/>
+          </a:xfrm>
+          <a:prstGeom prst="rect">
+            <a:avLst/>
+          </a:prstGeom>
+          <a:ln w="12700">
+            <a:miter lim="400000"/>
+          </a:ln>
+          <a:extLst>
+            <a:ext uri="{C572A759-6A51-4108-AA02-DFA0A04FC94B}">
+              <ma14:wrappingTextBoxFlag xmlns:ma14="http://schemas.microsoft.com/office/mac/drawingml/2011/main" val="1"/>
+            </a:ext>
+          </a:extLst>
+        </p:spPr>
+        <p:txBody>
+          <a:bodyPr lIns="45699" tIns="45699" rIns="45699" bIns="45699">
+            <a:spAutoFit/>
+          </a:bodyPr>
+          <a:lstStyle/>
+          <a:p>
+            <a:pPr>
+              <a:defRPr b="1" sz="2000"/>
+            </a:pPr>
+            <a:r>
+              <a:t>¿Cuál es el mejor modelo para estimar el valor de alquileres?</a:t>
+            </a:r>
+          </a:p>
+          <a:p>
+            <a:pPr>
+              <a:defRPr b="1" sz="2000"/>
+            </a:pPr>
+          </a:p>
+          <a:p>
+            <a:pPr/>
+            <a:r>
+              <a:t>Luego de entrenar distintos modelos de Machine Learning con los datos disponibles, podemos verificar que el modelo que mejor se adapta a la predicción del precio de alquiler es el Random Forest.</a:t>
+            </a:r>
+          </a:p>
+          <a:p>
+            <a:pPr/>
+          </a:p>
+          <a:p>
+            <a:pPr/>
+            <a:r>
+              <a:t>En el gráfico puede verse que los errores de estimación del modelo Random Forest se encuentran alrededor de €50, mientras que para los otros modelos alcanzan los €200.</a:t>
+            </a:r>
+          </a:p>
+        </p:txBody>
+      </p:sp>
+      <p:sp>
+        <p:nvSpPr>
+          <p:cNvPr id="275" name="Google Shape;247;p34"/>
           <p:cNvSpPr txBox="1"/>
           <p:nvPr>
             <p:ph type="sldNum" sz="quarter" idx="4294967295"/>
@@ -4504,8 +4560,8 @@
         </p:nvSpPr>
         <p:spPr>
           <a:xfrm>
-            <a:off x="11506202" y="6554423"/>
-            <a:ext cx="153964" cy="135547"/>
+            <a:off x="11506202" y="6554424"/>
+            <a:ext cx="153964" cy="135546"/>
           </a:xfrm>
           <a:prstGeom prst="rect">
             <a:avLst/>
@@ -4535,14 +4591,14 @@
       </p:sp>
       <p:sp>
         <p:nvSpPr>
-          <p:cNvPr id="273" name="Google Shape;233;p33"/>
+          <p:cNvPr id="276" name="Google Shape;248;p34"/>
           <p:cNvSpPr txBox="1"/>
           <p:nvPr/>
         </p:nvSpPr>
         <p:spPr>
           <a:xfrm>
-            <a:off x="1014050" y="830087"/>
-            <a:ext cx="2847872" cy="722214"/>
+            <a:off x="639132" y="656168"/>
+            <a:ext cx="2984227" cy="722214"/>
           </a:xfrm>
           <a:prstGeom prst="rect">
             <a:avLst/>
@@ -4566,67 +4622,21 @@
               <a:lnSpc>
                 <a:spcPct val="80000"/>
               </a:lnSpc>
-              <a:defRPr sz="2800"/>
+              <a:defRPr b="1" sz="2800"/>
             </a:pPr>
             <a:r>
-              <a:t>PRECIO VS </a:t>
-            </a:r>
-            <a:r>
-              <a:rPr b="1"/>
-              <a:t>ATRACCIONES</a:t>
-            </a:r>
-          </a:p>
-        </p:txBody>
-      </p:sp>
-      <p:sp>
-        <p:nvSpPr>
-          <p:cNvPr id="274" name="Google Shape;234;p33"/>
-          <p:cNvSpPr txBox="1"/>
-          <p:nvPr/>
-        </p:nvSpPr>
-        <p:spPr>
-          <a:xfrm>
-            <a:off x="4114102" y="716395"/>
-            <a:ext cx="7327877" cy="949598"/>
-          </a:xfrm>
-          <a:prstGeom prst="rect">
-            <a:avLst/>
-          </a:prstGeom>
-          <a:ln w="12700">
-            <a:miter lim="400000"/>
-          </a:ln>
-          <a:extLst>
-            <a:ext uri="{C572A759-6A51-4108-AA02-DFA0A04FC94B}">
-              <ma14:wrappingTextBoxFlag xmlns:ma14="http://schemas.microsoft.com/office/mac/drawingml/2011/main" val="1"/>
-            </a:ext>
-          </a:extLst>
-        </p:spPr>
-        <p:txBody>
-          <a:bodyPr lIns="45699" tIns="45699" rIns="45699" bIns="45699">
-            <a:spAutoFit/>
-          </a:bodyPr>
-          <a:lstStyle/>
-          <a:p>
-            <a:pPr>
-              <a:defRPr b="1" sz="2000"/>
-            </a:pPr>
-            <a:r>
-              <a:t>¿Cómo afecta la cercanía a atracciones al precio?</a:t>
-            </a:r>
-          </a:p>
-          <a:p>
-            <a:pPr>
-              <a:defRPr sz="1300"/>
-            </a:pPr>
-            <a:r>
-              <a:t>En los gráficos no puede observarse claramente que haya una relación directa entre distancia a atracciones o locales de comida y el precio de alquiler. Sin embargo, puede verse que a medida de que nos alejamos de esas atracciones turísticas, el precio máximo de alquiler tiende a bajar.</a:t>
+              <a:t>ESTIMACIÓN</a:t>
+            </a:r>
+            <a:r>
+              <a:rPr b="0"/>
+              <a:t> DE ALQUILERES</a:t>
             </a:r>
           </a:p>
         </p:txBody>
       </p:sp>
       <p:pic>
         <p:nvPicPr>
-          <p:cNvPr id="275" name="Imagen" descr="Imagen"/>
+          <p:cNvPr id="277" name="Imagen 1" descr="Imagen 1"/>
           <p:cNvPicPr>
             <a:picLocks noChangeAspect="1"/>
           </p:cNvPicPr>
@@ -4642,8 +4652,8 @@
         </p:blipFill>
         <p:spPr>
           <a:xfrm>
-            <a:off x="419044" y="2134666"/>
-            <a:ext cx="11116944" cy="3646433"/>
+            <a:off x="3818020" y="233986"/>
+            <a:ext cx="8164315" cy="6114428"/>
           </a:xfrm>
           <a:prstGeom prst="rect">
             <a:avLst/>
@@ -4692,77 +4702,7 @@
       </p:grpSpPr>
       <p:sp>
         <p:nvSpPr>
-          <p:cNvPr id="277" name="Google Shape;246;p34"/>
-          <p:cNvSpPr txBox="1"/>
-          <p:nvPr/>
-        </p:nvSpPr>
-        <p:spPr>
-          <a:xfrm>
-            <a:off x="570522" y="1807592"/>
-            <a:ext cx="2884823" cy="4098783"/>
-          </a:xfrm>
-          <a:prstGeom prst="rect">
-            <a:avLst/>
-          </a:prstGeom>
-          <a:ln w="12700">
-            <a:miter lim="400000"/>
-          </a:ln>
-          <a:extLst>
-            <a:ext uri="{C572A759-6A51-4108-AA02-DFA0A04FC94B}">
-              <ma14:wrappingTextBoxFlag xmlns:ma14="http://schemas.microsoft.com/office/mac/drawingml/2011/main" val="1"/>
-            </a:ext>
-          </a:extLst>
-        </p:spPr>
-        <p:txBody>
-          <a:bodyPr lIns="45699" tIns="45699" rIns="45699" bIns="45699">
-            <a:spAutoFit/>
-          </a:bodyPr>
-          <a:lstStyle/>
-          <a:p>
-            <a:pPr>
-              <a:defRPr b="1" sz="2000"/>
-            </a:pPr>
-            <a:r>
-              <a:t>¿Cuál es el mejor modelo para estimar el valor de alquileres?</a:t>
-            </a:r>
-          </a:p>
-          <a:p>
-            <a:pPr>
-              <a:defRPr b="1" sz="2000"/>
-            </a:pPr>
-          </a:p>
-          <a:p>
-            <a:pPr/>
-            <a:r>
-              <a:t>Luego de entrenar distintos modelos de Machine Learning con los datos disponibles, podemos verificar que el modelo que mejor se adapta a la predicción del precio de alquiler es el Random Forest.</a:t>
-            </a:r>
-          </a:p>
-          <a:p>
-            <a:pPr/>
-          </a:p>
-          <a:p>
-            <a:pPr/>
-            <a:r>
-              <a:t>En el gráfico puede verse que los errores de estimación </a:t>
-            </a:r>
-            <a:r>
-              <a:t>del modelo Random Forest </a:t>
-            </a:r>
-            <a:r>
-              <a:t>se encuentran alrededor de €50, mientras que para los otros modelos alcanzan los €</a:t>
-            </a:r>
-            <a:r>
-              <a:t>200</a:t>
-            </a:r>
-            <a:r>
-              <a:t>.</a:t>
-            </a:r>
-          </a:p>
-        </p:txBody>
-      </p:sp>
-      <p:sp>
-        <p:nvSpPr>
-          <p:cNvPr id="278" name="Google Shape;247;p34"/>
+          <p:cNvPr id="279" name="Google Shape;256;p35"/>
           <p:cNvSpPr txBox="1"/>
           <p:nvPr>
             <p:ph type="sldNum" sz="quarter" idx="4294967295"/>
@@ -4801,14 +4741,14 @@
       </p:sp>
       <p:sp>
         <p:nvSpPr>
-          <p:cNvPr id="279" name="Google Shape;248;p34"/>
+          <p:cNvPr id="280" name="Google Shape;257;p35"/>
           <p:cNvSpPr txBox="1"/>
           <p:nvPr/>
         </p:nvSpPr>
         <p:spPr>
           <a:xfrm>
-            <a:off x="639132" y="656168"/>
-            <a:ext cx="2984226" cy="722215"/>
+            <a:off x="3638977" y="506699"/>
+            <a:ext cx="7821501" cy="1190482"/>
           </a:xfrm>
           <a:prstGeom prst="rect">
             <a:avLst/>
@@ -4823,6 +4763,56 @@
           </a:extLst>
         </p:spPr>
         <p:txBody>
+          <a:bodyPr lIns="45699" tIns="45699" rIns="45699" bIns="45699">
+            <a:spAutoFit/>
+          </a:bodyPr>
+          <a:lstStyle/>
+          <a:p>
+            <a:pPr>
+              <a:defRPr b="1" sz="2000"/>
+            </a:pPr>
+            <a:r>
+              <a:t>¿Qué precisión tiene nuestro modelo para predecir el valor?</a:t>
+            </a:r>
+          </a:p>
+          <a:p>
+            <a:pPr/>
+            <a:r>
+              <a:t>Para el caso de Random Forest, podemos ver que los errores de estimación, según el histograma, se encuentran acotados a un +- 22% (una desviación estándar) en 78% de los casos. </a:t>
+            </a:r>
+          </a:p>
+          <a:p>
+            <a:pPr/>
+            <a:r>
+              <a:t>Esto implica que, si empleamos el modelo obtenido, tendremos un error menor al 22% en casi el 80% de los locales que analicemos en función de sus atributos.</a:t>
+            </a:r>
+          </a:p>
+        </p:txBody>
+      </p:sp>
+      <p:sp>
+        <p:nvSpPr>
+          <p:cNvPr id="281" name="Google Shape;258;p35"/>
+          <p:cNvSpPr txBox="1"/>
+          <p:nvPr/>
+        </p:nvSpPr>
+        <p:spPr>
+          <a:xfrm>
+            <a:off x="907414" y="740832"/>
+            <a:ext cx="2502962" cy="722215"/>
+          </a:xfrm>
+          <a:prstGeom prst="rect">
+            <a:avLst/>
+          </a:prstGeom>
+          <a:ln w="12700">
+            <a:miter lim="400000"/>
+          </a:ln>
+          <a:extLst>
+            <a:ext uri="{C572A759-6A51-4108-AA02-DFA0A04FC94B}">
+              <ma14:wrappingTextBoxFlag xmlns:ma14="http://schemas.microsoft.com/office/mac/drawingml/2011/main" val="1"/>
+            </a:ext>
+          </a:extLst>
+        </p:spPr>
+        <p:txBody>
           <a:bodyPr lIns="0" tIns="0" rIns="0" bIns="0">
             <a:spAutoFit/>
           </a:bodyPr>
@@ -4835,18 +4825,18 @@
               <a:defRPr b="1" sz="2800"/>
             </a:pPr>
             <a:r>
-              <a:t>ESTIMACIÓN</a:t>
+              <a:t>ERRORES</a:t>
             </a:r>
             <a:r>
               <a:rPr b="0"/>
-              <a:t> DE ALQUILERES</a:t>
+              <a:t> DE ESTIMACIÓN</a:t>
             </a:r>
           </a:p>
         </p:txBody>
       </p:sp>
       <p:pic>
         <p:nvPicPr>
-          <p:cNvPr id="280" name="Imagen 1" descr="Imagen 1"/>
+          <p:cNvPr id="282" name="Imagen 1" descr="Imagen 1"/>
           <p:cNvPicPr>
             <a:picLocks noChangeAspect="1"/>
           </p:cNvPicPr>
@@ -4862,8 +4852,8 @@
         </p:blipFill>
         <p:spPr>
           <a:xfrm>
-            <a:off x="3818020" y="233986"/>
-            <a:ext cx="8164315" cy="6114428"/>
+            <a:off x="452465" y="2047679"/>
+            <a:ext cx="10955314" cy="4256800"/>
           </a:xfrm>
           <a:prstGeom prst="rect">
             <a:avLst/>
@@ -4912,7 +4902,35 @@
       </p:grpSpPr>
       <p:sp>
         <p:nvSpPr>
-          <p:cNvPr id="282" name="Google Shape;256;p35"/>
+          <p:cNvPr id="284" name="Google Shape;281;p37"/>
+          <p:cNvSpPr/>
+          <p:nvPr/>
+        </p:nvSpPr>
+        <p:spPr>
+          <a:xfrm>
+            <a:off x="4386591" y="370218"/>
+            <a:ext cx="13886" cy="6231491"/>
+          </a:xfrm>
+          <a:prstGeom prst="line">
+            <a:avLst/>
+          </a:prstGeom>
+          <a:ln>
+            <a:solidFill>
+              <a:srgbClr val="31ADCD"/>
+            </a:solidFill>
+          </a:ln>
+        </p:spPr>
+        <p:txBody>
+          <a:bodyPr lIns="45718" tIns="45718" rIns="45718" bIns="45718"/>
+          <a:lstStyle/>
+          <a:p>
+            <a:pPr/>
+          </a:p>
+        </p:txBody>
+      </p:sp>
+      <p:sp>
+        <p:nvSpPr>
+          <p:cNvPr id="285" name="Google Shape;282;p37"/>
           <p:cNvSpPr txBox="1"/>
           <p:nvPr>
             <p:ph type="sldNum" sz="quarter" idx="4294967295"/>
@@ -4920,7 +4938,7 @@
         </p:nvSpPr>
         <p:spPr>
           <a:xfrm>
-            <a:off x="11506202" y="6554424"/>
+            <a:off x="11506202" y="6554423"/>
             <a:ext cx="153964" cy="135546"/>
           </a:xfrm>
           <a:prstGeom prst="rect">
@@ -4951,14 +4969,14 @@
       </p:sp>
       <p:sp>
         <p:nvSpPr>
-          <p:cNvPr id="283" name="Google Shape;257;p35"/>
+          <p:cNvPr id="286" name="Google Shape;283;p37"/>
           <p:cNvSpPr txBox="1"/>
           <p:nvPr/>
         </p:nvSpPr>
         <p:spPr>
           <a:xfrm>
-            <a:off x="3638977" y="506699"/>
-            <a:ext cx="7821500" cy="1190482"/>
+            <a:off x="375083" y="2825700"/>
+            <a:ext cx="3876077" cy="722215"/>
           </a:xfrm>
           <a:prstGeom prst="rect">
             <a:avLst/>
@@ -4973,362 +4991,6 @@
           </a:extLst>
         </p:spPr>
         <p:txBody>
-          <a:bodyPr lIns="45699" tIns="45699" rIns="45699" bIns="45699">
-            <a:spAutoFit/>
-          </a:bodyPr>
-          <a:lstStyle/>
-          <a:p>
-            <a:pPr>
-              <a:defRPr b="1" sz="2000"/>
-            </a:pPr>
-            <a:r>
-              <a:t>¿Qué precisión tiene nuestro modelo para predecir el valor?</a:t>
-            </a:r>
-          </a:p>
-          <a:p>
-            <a:pPr/>
-            <a:r>
-              <a:t>Para el caso de Random Forest, podemos ver que los errores de estimación, según el histograma, se encuentran acotados a un +- 22% (una desviación estándar) en 78% de los casos. </a:t>
-            </a:r>
-          </a:p>
-          <a:p>
-            <a:pPr/>
-            <a:r>
-              <a:t>Esto implica que, si empleamos el modelo obtenido, tendremos un error menor al 22% en casi el 80% de los locales que analicemos en función de sus atributos.</a:t>
-            </a:r>
-          </a:p>
-        </p:txBody>
-      </p:sp>
-      <p:sp>
-        <p:nvSpPr>
-          <p:cNvPr id="284" name="Google Shape;258;p35"/>
-          <p:cNvSpPr txBox="1"/>
-          <p:nvPr/>
-        </p:nvSpPr>
-        <p:spPr>
-          <a:xfrm>
-            <a:off x="907414" y="740833"/>
-            <a:ext cx="2502962" cy="722214"/>
-          </a:xfrm>
-          <a:prstGeom prst="rect">
-            <a:avLst/>
-          </a:prstGeom>
-          <a:ln w="12700">
-            <a:miter lim="400000"/>
-          </a:ln>
-          <a:extLst>
-            <a:ext uri="{C572A759-6A51-4108-AA02-DFA0A04FC94B}">
-              <ma14:wrappingTextBoxFlag xmlns:ma14="http://schemas.microsoft.com/office/mac/drawingml/2011/main" val="1"/>
-            </a:ext>
-          </a:extLst>
-        </p:spPr>
-        <p:txBody>
-          <a:bodyPr lIns="0" tIns="0" rIns="0" bIns="0">
-            <a:spAutoFit/>
-          </a:bodyPr>
-          <a:lstStyle/>
-          <a:p>
-            <a:pPr>
-              <a:lnSpc>
-                <a:spcPct val="80000"/>
-              </a:lnSpc>
-              <a:defRPr b="1" sz="2800"/>
-            </a:pPr>
-            <a:r>
-              <a:t>ERRORES</a:t>
-            </a:r>
-            <a:r>
-              <a:rPr b="0"/>
-              <a:t> DE ESTIMACIÓN</a:t>
-            </a:r>
-          </a:p>
-        </p:txBody>
-      </p:sp>
-      <p:pic>
-        <p:nvPicPr>
-          <p:cNvPr id="285" name="Imagen 1" descr="Imagen 1"/>
-          <p:cNvPicPr>
-            <a:picLocks noChangeAspect="1"/>
-          </p:cNvPicPr>
-          <p:nvPr/>
-        </p:nvPicPr>
-        <p:blipFill>
-          <a:blip r:embed="rId2">
-            <a:extLst/>
-          </a:blip>
-          <a:stretch>
-            <a:fillRect/>
-          </a:stretch>
-        </p:blipFill>
-        <p:spPr>
-          <a:xfrm>
-            <a:off x="452466" y="2047679"/>
-            <a:ext cx="10955313" cy="4256800"/>
-          </a:xfrm>
-          <a:prstGeom prst="rect">
-            <a:avLst/>
-          </a:prstGeom>
-          <a:ln w="12700">
-            <a:miter lim="400000"/>
-          </a:ln>
-        </p:spPr>
-      </p:pic>
-    </p:spTree>
-  </p:cSld>
-  <p:clrMapOvr>
-    <a:masterClrMapping/>
-  </p:clrMapOvr>
-  <mc:AlternateContent xmlns:mc="http://schemas.openxmlformats.org/markup-compatibility/2006">
-    <mc:Choice xmlns:p14="http://schemas.microsoft.com/office/powerpoint/2010/main" Requires="p14">
-      <p:transition spd="slow" advClick="1" p14:dur="1200">
-        <p:push dir="l"/>
-      </p:transition>
-    </mc:Choice>
-    <mc:Fallback>
-      <p:transition spd="slow">
-        <p:fade/>
-      </p:transition>
-    </mc:Fallback>
-  </mc:AlternateContent>
-</p:sld>
-</file>
-
-<file path=ppt/slides/slide13.xml><?xml version="1.0" encoding="utf-8"?>
-<p:sld xmlns:a="http://schemas.openxmlformats.org/drawingml/2006/main" xmlns:r="http://schemas.openxmlformats.org/officeDocument/2006/relationships" xmlns:p="http://schemas.openxmlformats.org/presentationml/2006/main" xmlns:m="http://schemas.openxmlformats.org/officeDocument/2006/math" xmlns:a14="http://schemas.microsoft.com/office/drawing/2010/main" showMasterSp="1" showMasterPhAnim="1">
-  <p:cSld>
-    <p:spTree>
-      <p:nvGrpSpPr>
-        <p:cNvPr id="1" name=""/>
-        <p:cNvGrpSpPr/>
-        <p:nvPr/>
-      </p:nvGrpSpPr>
-      <p:grpSpPr>
-        <a:xfrm>
-          <a:off x="0" y="0"/>
-          <a:ext cx="0" cy="0"/>
-          <a:chOff x="0" y="0"/>
-          <a:chExt cx="0" cy="0"/>
-        </a:xfrm>
-      </p:grpSpPr>
-      <p:sp>
-        <p:nvSpPr>
-          <p:cNvPr id="287" name="Google Shape;273;p36"/>
-          <p:cNvSpPr txBox="1"/>
-          <p:nvPr>
-            <p:ph type="sldNum" sz="quarter" idx="4294967295"/>
-          </p:nvPr>
-        </p:nvSpPr>
-        <p:spPr>
-          <a:xfrm>
-            <a:off x="11506202" y="6554423"/>
-            <a:ext cx="153964" cy="135546"/>
-          </a:xfrm>
-          <a:prstGeom prst="rect">
-            <a:avLst/>
-          </a:prstGeom>
-          <a:extLst>
-            <a:ext uri="{C572A759-6A51-4108-AA02-DFA0A04FC94B}">
-              <ma14:wrappingTextBoxFlag xmlns:ma14="http://schemas.microsoft.com/office/mac/drawingml/2011/main" val="1"/>
-            </a:ext>
-          </a:extLst>
-        </p:spPr>
-        <p:txBody>
-          <a:bodyPr lIns="0" tIns="0" rIns="0" bIns="0"/>
-          <a:lstStyle>
-            <a:lvl1pPr algn="l">
-              <a:defRPr sz="1000">
-                <a:solidFill>
-                  <a:srgbClr val="000000"/>
-                </a:solidFill>
-              </a:defRPr>
-            </a:lvl1pPr>
-          </a:lstStyle>
-          <a:p>
-            <a:pPr/>
-            <a:fld id="{86CB4B4D-7CA3-9044-876B-883B54F8677D}" type="slidenum"/>
-          </a:p>
-        </p:txBody>
-      </p:sp>
-      <p:sp>
-        <p:nvSpPr>
-          <p:cNvPr id="288" name="Google Shape;274;p36"/>
-          <p:cNvSpPr txBox="1"/>
-          <p:nvPr/>
-        </p:nvSpPr>
-        <p:spPr>
-          <a:xfrm>
-            <a:off x="429590" y="2465870"/>
-            <a:ext cx="10857904" cy="1557399"/>
-          </a:xfrm>
-          <a:prstGeom prst="rect">
-            <a:avLst/>
-          </a:prstGeom>
-          <a:ln w="12700">
-            <a:miter lim="400000"/>
-          </a:ln>
-          <a:extLst>
-            <a:ext uri="{C572A759-6A51-4108-AA02-DFA0A04FC94B}">
-              <ma14:wrappingTextBoxFlag xmlns:ma14="http://schemas.microsoft.com/office/mac/drawingml/2011/main" val="1"/>
-            </a:ext>
-          </a:extLst>
-        </p:spPr>
-        <p:txBody>
-          <a:bodyPr lIns="0" tIns="0" rIns="0" bIns="0" anchor="ctr">
-            <a:spAutoFit/>
-          </a:bodyPr>
-          <a:lstStyle/>
-          <a:p>
-            <a:pPr algn="ctr">
-              <a:lnSpc>
-                <a:spcPct val="80000"/>
-              </a:lnSpc>
-              <a:defRPr sz="6000"/>
-            </a:pPr>
-            <a:r>
-              <a:t>INSIGHTS &amp;</a:t>
-            </a:r>
-          </a:p>
-          <a:p>
-            <a:pPr algn="ctr">
-              <a:lnSpc>
-                <a:spcPct val="80000"/>
-              </a:lnSpc>
-              <a:defRPr b="1" sz="6000"/>
-            </a:pPr>
-            <a:r>
-              <a:t>RECOMENDACIONES</a:t>
-            </a:r>
-          </a:p>
-        </p:txBody>
-      </p:sp>
-    </p:spTree>
-  </p:cSld>
-  <p:clrMapOvr>
-    <a:masterClrMapping/>
-  </p:clrMapOvr>
-  <mc:AlternateContent xmlns:mc="http://schemas.openxmlformats.org/markup-compatibility/2006">
-    <mc:Choice xmlns:p14="http://schemas.microsoft.com/office/powerpoint/2010/main" Requires="p14">
-      <p:transition spd="slow" advClick="1" p14:dur="1200">
-        <p:push dir="l"/>
-      </p:transition>
-    </mc:Choice>
-    <mc:Fallback>
-      <p:transition spd="slow">
-        <p:fade/>
-      </p:transition>
-    </mc:Fallback>
-  </mc:AlternateContent>
-</p:sld>
-</file>
-
-<file path=ppt/slides/slide14.xml><?xml version="1.0" encoding="utf-8"?>
-<p:sld xmlns:a="http://schemas.openxmlformats.org/drawingml/2006/main" xmlns:r="http://schemas.openxmlformats.org/officeDocument/2006/relationships" xmlns:p="http://schemas.openxmlformats.org/presentationml/2006/main" xmlns:m="http://schemas.openxmlformats.org/officeDocument/2006/math" xmlns:a14="http://schemas.microsoft.com/office/drawing/2010/main" showMasterSp="1" showMasterPhAnim="1">
-  <p:cSld>
-    <p:spTree>
-      <p:nvGrpSpPr>
-        <p:cNvPr id="1" name=""/>
-        <p:cNvGrpSpPr/>
-        <p:nvPr/>
-      </p:nvGrpSpPr>
-      <p:grpSpPr>
-        <a:xfrm>
-          <a:off x="0" y="0"/>
-          <a:ext cx="0" cy="0"/>
-          <a:chOff x="0" y="0"/>
-          <a:chExt cx="0" cy="0"/>
-        </a:xfrm>
-      </p:grpSpPr>
-      <p:sp>
-        <p:nvSpPr>
-          <p:cNvPr id="290" name="Google Shape;281;p37"/>
-          <p:cNvSpPr/>
-          <p:nvPr/>
-        </p:nvSpPr>
-        <p:spPr>
-          <a:xfrm>
-            <a:off x="4386591" y="370219"/>
-            <a:ext cx="13885" cy="6231489"/>
-          </a:xfrm>
-          <a:prstGeom prst="line">
-            <a:avLst/>
-          </a:prstGeom>
-          <a:ln>
-            <a:solidFill>
-              <a:srgbClr val="31ADCD"/>
-            </a:solidFill>
-          </a:ln>
-        </p:spPr>
-        <p:txBody>
-          <a:bodyPr lIns="45718" tIns="45718" rIns="45718" bIns="45718"/>
-          <a:lstStyle/>
-          <a:p>
-            <a:pPr/>
-          </a:p>
-        </p:txBody>
-      </p:sp>
-      <p:sp>
-        <p:nvSpPr>
-          <p:cNvPr id="291" name="Google Shape;282;p37"/>
-          <p:cNvSpPr txBox="1"/>
-          <p:nvPr>
-            <p:ph type="sldNum" sz="quarter" idx="4294967295"/>
-          </p:nvPr>
-        </p:nvSpPr>
-        <p:spPr>
-          <a:xfrm>
-            <a:off x="11506202" y="6554423"/>
-            <a:ext cx="153964" cy="135546"/>
-          </a:xfrm>
-          <a:prstGeom prst="rect">
-            <a:avLst/>
-          </a:prstGeom>
-          <a:extLst>
-            <a:ext uri="{C572A759-6A51-4108-AA02-DFA0A04FC94B}">
-              <ma14:wrappingTextBoxFlag xmlns:ma14="http://schemas.microsoft.com/office/mac/drawingml/2011/main" val="1"/>
-            </a:ext>
-          </a:extLst>
-        </p:spPr>
-        <p:txBody>
-          <a:bodyPr lIns="0" tIns="0" rIns="0" bIns="0"/>
-          <a:lstStyle>
-            <a:lvl1pPr algn="l">
-              <a:defRPr sz="1000">
-                <a:solidFill>
-                  <a:srgbClr val="000000"/>
-                </a:solidFill>
-              </a:defRPr>
-            </a:lvl1pPr>
-          </a:lstStyle>
-          <a:p>
-            <a:pPr/>
-            <a:fld id="{86CB4B4D-7CA3-9044-876B-883B54F8677D}" type="slidenum"/>
-          </a:p>
-        </p:txBody>
-      </p:sp>
-      <p:sp>
-        <p:nvSpPr>
-          <p:cNvPr id="292" name="Google Shape;283;p37"/>
-          <p:cNvSpPr txBox="1"/>
-          <p:nvPr/>
-        </p:nvSpPr>
-        <p:spPr>
-          <a:xfrm>
-            <a:off x="375084" y="2825701"/>
-            <a:ext cx="3876075" cy="722214"/>
-          </a:xfrm>
-          <a:prstGeom prst="rect">
-            <a:avLst/>
-          </a:prstGeom>
-          <a:ln w="12700">
-            <a:miter lim="400000"/>
-          </a:ln>
-          <a:extLst>
-            <a:ext uri="{C572A759-6A51-4108-AA02-DFA0A04FC94B}">
-              <ma14:wrappingTextBoxFlag xmlns:ma14="http://schemas.microsoft.com/office/mac/drawingml/2011/main" val="1"/>
-            </a:ext>
-          </a:extLst>
-        </p:spPr>
-        <p:txBody>
           <a:bodyPr lIns="0" tIns="0" rIns="0" bIns="0">
             <a:spAutoFit/>
           </a:bodyPr>
@@ -5352,14 +5014,14 @@
       </p:sp>
       <p:sp>
         <p:nvSpPr>
-          <p:cNvPr id="293" name="Google Shape;284;p37"/>
+          <p:cNvPr id="287" name="Google Shape;284;p37"/>
           <p:cNvSpPr txBox="1"/>
           <p:nvPr/>
         </p:nvSpPr>
         <p:spPr>
           <a:xfrm>
             <a:off x="4649806" y="990843"/>
-            <a:ext cx="7399288" cy="1251490"/>
+            <a:ext cx="7399289" cy="1251489"/>
           </a:xfrm>
           <a:prstGeom prst="rect">
             <a:avLst/>
@@ -5432,7 +5094,7 @@
       </p:sp>
       <p:sp>
         <p:nvSpPr>
-          <p:cNvPr id="294" name="Google Shape;285;p37"/>
+          <p:cNvPr id="288" name="Google Shape;285;p37"/>
           <p:cNvSpPr txBox="1"/>
           <p:nvPr/>
         </p:nvSpPr>
@@ -5498,13 +5160,13 @@
       </p:sp>
       <p:sp>
         <p:nvSpPr>
-          <p:cNvPr id="295" name="Google Shape;284;p37"/>
+          <p:cNvPr id="289" name="Google Shape;284;p37"/>
           <p:cNvSpPr txBox="1"/>
           <p:nvPr/>
         </p:nvSpPr>
         <p:spPr>
           <a:xfrm>
-            <a:off x="4649866" y="4131284"/>
+            <a:off x="4649866" y="4131283"/>
             <a:ext cx="7399168" cy="1543590"/>
           </a:xfrm>
           <a:prstGeom prst="rect">
@@ -5543,10 +5205,7 @@
               <a:defRPr sz="2000"/>
             </a:pPr>
             <a:r>
-              <a:t>Random Forest</a:t>
-            </a:r>
-            <a:r>
-              <a:t> es el modelo que mejor predice los precios</a:t>
+              <a:t>Random Forest es el modelo que mejor predice los precios</a:t>
             </a:r>
           </a:p>
           <a:p>
@@ -5677,8 +5336,8 @@
         </p:nvSpPr>
         <p:spPr>
           <a:xfrm>
-            <a:off x="1849624" y="1495864"/>
-            <a:ext cx="4927677" cy="345630"/>
+            <a:off x="1849623" y="1495864"/>
+            <a:ext cx="4927678" cy="345629"/>
           </a:xfrm>
           <a:prstGeom prst="rect">
             <a:avLst/>
@@ -5721,7 +5380,7 @@
         <p:spPr>
           <a:xfrm>
             <a:off x="1680080" y="1367046"/>
-            <a:ext cx="2" cy="603267"/>
+            <a:ext cx="3" cy="603268"/>
           </a:xfrm>
           <a:prstGeom prst="line">
             <a:avLst/>
@@ -5802,7 +5461,7 @@
         <p:spPr>
           <a:xfrm>
             <a:off x="1849627" y="3557816"/>
-            <a:ext cx="4927687" cy="345630"/>
+            <a:ext cx="4927687" cy="345629"/>
           </a:xfrm>
           <a:prstGeom prst="rect">
             <a:avLst/>
@@ -5845,7 +5504,7 @@
         <p:spPr>
           <a:xfrm>
             <a:off x="1680080" y="2383924"/>
-            <a:ext cx="2" cy="603267"/>
+            <a:ext cx="3" cy="603268"/>
           </a:xfrm>
           <a:prstGeom prst="line">
             <a:avLst/>
@@ -5926,7 +5585,7 @@
         <p:spPr>
           <a:xfrm>
             <a:off x="1680080" y="3399066"/>
-            <a:ext cx="2" cy="603267"/>
+            <a:ext cx="3" cy="603268"/>
           </a:xfrm>
           <a:prstGeom prst="line">
             <a:avLst/>
@@ -5996,8 +5655,8 @@
         </p:nvSpPr>
         <p:spPr>
           <a:xfrm>
-            <a:off x="1849626" y="4519174"/>
-            <a:ext cx="4927675" cy="345630"/>
+            <a:off x="1849625" y="4519174"/>
+            <a:ext cx="4927677" cy="345629"/>
           </a:xfrm>
           <a:prstGeom prst="rect">
             <a:avLst/>
@@ -6093,7 +5752,7 @@
         <p:spPr>
           <a:xfrm>
             <a:off x="1680080" y="4414711"/>
-            <a:ext cx="2" cy="603267"/>
+            <a:ext cx="3" cy="603268"/>
           </a:xfrm>
           <a:prstGeom prst="line">
             <a:avLst/>
@@ -6163,8 +5822,8 @@
         </p:nvSpPr>
         <p:spPr>
           <a:xfrm>
-            <a:off x="1849625" y="5559173"/>
-            <a:ext cx="4927675" cy="345629"/>
+            <a:off x="1849624" y="5559173"/>
+            <a:ext cx="4927677" cy="345629"/>
           </a:xfrm>
           <a:prstGeom prst="rect">
             <a:avLst/>
@@ -6260,7 +5919,7 @@
         <p:spPr>
           <a:xfrm>
             <a:off x="1680080" y="5454710"/>
-            <a:ext cx="2" cy="603267"/>
+            <a:ext cx="3" cy="603268"/>
           </a:xfrm>
           <a:prstGeom prst="line">
             <a:avLst/>
@@ -6354,8 +6013,8 @@
         </p:nvSpPr>
         <p:spPr>
           <a:xfrm>
-            <a:off x="3238500" y="287522"/>
-            <a:ext cx="13885" cy="6231489"/>
+            <a:off x="3238499" y="287522"/>
+            <a:ext cx="13886" cy="6231490"/>
           </a:xfrm>
           <a:prstGeom prst="line">
             <a:avLst/>
@@ -6422,7 +6081,7 @@
         <p:spPr>
           <a:xfrm>
             <a:off x="384622" y="2758762"/>
-            <a:ext cx="2718100" cy="722215"/>
+            <a:ext cx="2718100" cy="722214"/>
           </a:xfrm>
           <a:prstGeom prst="rect">
             <a:avLst/>
@@ -6473,8 +6132,8 @@
         </p:nvSpPr>
         <p:spPr>
           <a:xfrm>
-            <a:off x="3629624" y="700739"/>
-            <a:ext cx="8012452" cy="5240952"/>
+            <a:off x="3629624" y="700738"/>
+            <a:ext cx="8012453" cy="5240952"/>
           </a:xfrm>
           <a:prstGeom prst="rect">
             <a:avLst/>
@@ -6660,8 +6319,8 @@
         </p:nvSpPr>
         <p:spPr>
           <a:xfrm>
-            <a:off x="3238500" y="287522"/>
-            <a:ext cx="13885" cy="6231489"/>
+            <a:off x="3238499" y="287522"/>
+            <a:ext cx="13886" cy="6231490"/>
           </a:xfrm>
           <a:prstGeom prst="line">
             <a:avLst/>
@@ -6755,10 +6414,7 @@
               <a:defRPr sz="2800"/>
             </a:pPr>
             <a:r>
-              <a:t>PREGUNTAS DE</a:t>
-            </a:r>
-            <a:r>
-              <a:t> </a:t>
+              <a:t>PREGUNTAS DE </a:t>
             </a:r>
             <a:r>
               <a:rPr b="1"/>
@@ -6775,8 +6431,8 @@
         </p:nvSpPr>
         <p:spPr>
           <a:xfrm>
-            <a:off x="3629624" y="1243112"/>
-            <a:ext cx="8012452" cy="4135220"/>
+            <a:off x="3629624" y="1243111"/>
+            <a:ext cx="8012453" cy="4135221"/>
           </a:xfrm>
           <a:prstGeom prst="rect">
             <a:avLst/>
@@ -6947,53 +6603,14 @@
       </p:grpSpPr>
       <p:sp>
         <p:nvSpPr>
-          <p:cNvPr id="237" name="Google Shape;195;p30"/>
-          <p:cNvSpPr txBox="1"/>
-          <p:nvPr>
-            <p:ph type="sldNum" sz="quarter" idx="4294967295"/>
-          </p:nvPr>
-        </p:nvSpPr>
-        <p:spPr>
-          <a:xfrm>
-            <a:off x="11506202" y="6554423"/>
-            <a:ext cx="127001" cy="135546"/>
-          </a:xfrm>
-          <a:prstGeom prst="rect">
-            <a:avLst/>
-          </a:prstGeom>
-          <a:extLst>
-            <a:ext uri="{C572A759-6A51-4108-AA02-DFA0A04FC94B}">
-              <ma14:wrappingTextBoxFlag xmlns:ma14="http://schemas.microsoft.com/office/mac/drawingml/2011/main" val="1"/>
-            </a:ext>
-          </a:extLst>
-        </p:spPr>
-        <p:txBody>
-          <a:bodyPr lIns="0" tIns="0" rIns="0" bIns="0"/>
-          <a:lstStyle>
-            <a:lvl1pPr algn="l">
-              <a:defRPr sz="1000">
-                <a:solidFill>
-                  <a:srgbClr val="000000"/>
-                </a:solidFill>
-              </a:defRPr>
-            </a:lvl1pPr>
-          </a:lstStyle>
-          <a:p>
-            <a:pPr/>
-            <a:fld id="{86CB4B4D-7CA3-9044-876B-883B54F8677D}" type="slidenum"/>
-          </a:p>
-        </p:txBody>
-      </p:sp>
-      <p:sp>
-        <p:nvSpPr>
-          <p:cNvPr id="238" name="Google Shape;196;p30"/>
+          <p:cNvPr id="237" name="Google Shape;176;p29"/>
           <p:cNvSpPr txBox="1"/>
           <p:nvPr/>
         </p:nvSpPr>
         <p:spPr>
           <a:xfrm>
-            <a:off x="429590" y="2505668"/>
-            <a:ext cx="10857904" cy="1557398"/>
+            <a:off x="5367509" y="829757"/>
+            <a:ext cx="2564656" cy="575891"/>
           </a:xfrm>
           <a:prstGeom prst="rect">
             <a:avLst/>
@@ -7008,6 +6625,57 @@
           </a:extLst>
         </p:spPr>
         <p:txBody>
+          <a:bodyPr lIns="0" tIns="0" rIns="0" bIns="0" anchor="ctr">
+            <a:spAutoFit/>
+          </a:bodyPr>
+          <a:lstStyle/>
+          <a:p>
+            <a:pPr algn="ctr">
+              <a:defRPr b="1" sz="2000"/>
+            </a:pPr>
+            <a:r>
+              <a:t>Cantidad </a:t>
+            </a:r>
+            <a:r>
+              <a:rPr b="0"/>
+              <a:t>de Locales</a:t>
+            </a:r>
+            <a:endParaRPr sz="3000"/>
+          </a:p>
+          <a:p>
+            <a:pPr algn="ctr">
+              <a:defRPr b="1" sz="2000"/>
+            </a:pPr>
+            <a:r>
+              <a:t>41.714</a:t>
+            </a:r>
+          </a:p>
+        </p:txBody>
+      </p:sp>
+      <p:sp>
+        <p:nvSpPr>
+          <p:cNvPr id="238" name="Google Shape;182;p29"/>
+          <p:cNvSpPr txBox="1"/>
+          <p:nvPr/>
+        </p:nvSpPr>
+        <p:spPr>
+          <a:xfrm>
+            <a:off x="1055765" y="1080971"/>
+            <a:ext cx="2957679" cy="722214"/>
+          </a:xfrm>
+          <a:prstGeom prst="rect">
+            <a:avLst/>
+          </a:prstGeom>
+          <a:ln w="12700">
+            <a:miter lim="400000"/>
+          </a:ln>
+          <a:extLst>
+            <a:ext uri="{C572A759-6A51-4108-AA02-DFA0A04FC94B}">
+              <ma14:wrappingTextBoxFlag xmlns:ma14="http://schemas.microsoft.com/office/mac/drawingml/2011/main" val="1"/>
+            </a:ext>
+          </a:extLst>
+        </p:spPr>
+        <p:txBody>
           <a:bodyPr lIns="0" tIns="0" rIns="0" bIns="0">
             <a:spAutoFit/>
           </a:bodyPr>
@@ -7017,21 +6685,309 @@
               <a:lnSpc>
                 <a:spcPct val="80000"/>
               </a:lnSpc>
-              <a:defRPr sz="6000"/>
+              <a:defRPr b="1" sz="2800"/>
             </a:pPr>
             <a:r>
-              <a:t>ANÁLISIS </a:t>
-            </a:r>
-          </a:p>
+              <a:t>DATOS </a:t>
+            </a:r>
+            <a:r>
+              <a:rPr b="0"/>
+              <a:t>DE ALQUILER</a:t>
+            </a:r>
+          </a:p>
+        </p:txBody>
+      </p:sp>
+      <p:pic>
+        <p:nvPicPr>
+          <p:cNvPr id="239" name="Imagen 4" descr="Imagen 4"/>
+          <p:cNvPicPr>
+            <a:picLocks noChangeAspect="1"/>
+          </p:cNvPicPr>
+          <p:nvPr/>
+        </p:nvPicPr>
+        <p:blipFill>
+          <a:blip r:embed="rId2">
+            <a:extLst/>
+          </a:blip>
+          <a:stretch>
+            <a:fillRect/>
+          </a:stretch>
+        </p:blipFill>
+        <p:spPr>
+          <a:xfrm>
+            <a:off x="4342017" y="575412"/>
+            <a:ext cx="1072888" cy="967111"/>
+          </a:xfrm>
+          <a:prstGeom prst="rect">
+            <a:avLst/>
+          </a:prstGeom>
+          <a:ln w="12700">
+            <a:miter lim="400000"/>
+          </a:ln>
+        </p:spPr>
+      </p:pic>
+      <p:pic>
+        <p:nvPicPr>
+          <p:cNvPr id="240" name="Imagen 5" descr="Imagen 5"/>
+          <p:cNvPicPr>
+            <a:picLocks noChangeAspect="1"/>
+          </p:cNvPicPr>
+          <p:nvPr/>
+        </p:nvPicPr>
+        <p:blipFill>
+          <a:blip r:embed="rId3">
+            <a:extLst/>
+          </a:blip>
+          <a:stretch>
+            <a:fillRect/>
+          </a:stretch>
+        </p:blipFill>
+        <p:spPr>
+          <a:xfrm>
+            <a:off x="4378850" y="1696102"/>
+            <a:ext cx="999221" cy="700947"/>
+          </a:xfrm>
+          <a:prstGeom prst="rect">
+            <a:avLst/>
+          </a:prstGeom>
+          <a:ln w="12700">
+            <a:miter lim="400000"/>
+          </a:ln>
+        </p:spPr>
+      </p:pic>
+      <p:sp>
+        <p:nvSpPr>
+          <p:cNvPr id="241" name="Google Shape;176;p29"/>
+          <p:cNvSpPr txBox="1"/>
+          <p:nvPr/>
+        </p:nvSpPr>
+        <p:spPr>
+          <a:xfrm>
+            <a:off x="9286230" y="829757"/>
+            <a:ext cx="1651895" cy="575891"/>
+          </a:xfrm>
+          <a:prstGeom prst="rect">
+            <a:avLst/>
+          </a:prstGeom>
+          <a:ln w="12700">
+            <a:miter lim="400000"/>
+          </a:ln>
+          <a:extLst>
+            <a:ext uri="{C572A759-6A51-4108-AA02-DFA0A04FC94B}">
+              <ma14:wrappingTextBoxFlag xmlns:ma14="http://schemas.microsoft.com/office/mac/drawingml/2011/main" val="1"/>
+            </a:ext>
+          </a:extLst>
+        </p:spPr>
+        <p:txBody>
+          <a:bodyPr lIns="0" tIns="0" rIns="0" bIns="0" anchor="ctr">
+            <a:spAutoFit/>
+          </a:bodyPr>
+          <a:lstStyle/>
           <a:p>
             <a:pPr algn="ctr">
-              <a:lnSpc>
-                <a:spcPct val="80000"/>
-              </a:lnSpc>
-              <a:defRPr b="1" sz="6000"/>
+              <a:defRPr b="1" sz="2000"/>
             </a:pPr>
             <a:r>
-              <a:t>EXPLORATORIO</a:t>
+              <a:t>Ciudades</a:t>
+            </a:r>
+          </a:p>
+          <a:p>
+            <a:pPr algn="ctr">
+              <a:defRPr b="1" sz="2000"/>
+            </a:pPr>
+            <a:r>
+              <a:t>9 </a:t>
+            </a:r>
+          </a:p>
+        </p:txBody>
+      </p:sp>
+      <p:sp>
+        <p:nvSpPr>
+          <p:cNvPr id="242" name="Google Shape;176;p29"/>
+          <p:cNvSpPr txBox="1"/>
+          <p:nvPr/>
+        </p:nvSpPr>
+        <p:spPr>
+          <a:xfrm>
+            <a:off x="5394002" y="1758630"/>
+            <a:ext cx="2511672" cy="575891"/>
+          </a:xfrm>
+          <a:prstGeom prst="rect">
+            <a:avLst/>
+          </a:prstGeom>
+          <a:ln w="12700">
+            <a:miter lim="400000"/>
+          </a:ln>
+          <a:extLst>
+            <a:ext uri="{C572A759-6A51-4108-AA02-DFA0A04FC94B}">
+              <ma14:wrappingTextBoxFlag xmlns:ma14="http://schemas.microsoft.com/office/mac/drawingml/2011/main" val="1"/>
+            </a:ext>
+          </a:extLst>
+        </p:spPr>
+        <p:txBody>
+          <a:bodyPr lIns="0" tIns="0" rIns="0" bIns="0" anchor="ctr">
+            <a:spAutoFit/>
+          </a:bodyPr>
+          <a:lstStyle/>
+          <a:p>
+            <a:pPr algn="ctr">
+              <a:defRPr b="1" sz="2000"/>
+            </a:pPr>
+            <a:r>
+              <a:t>Rango</a:t>
+            </a:r>
+            <a:r>
+              <a:rPr b="0"/>
+              <a:t> de</a:t>
+            </a:r>
+            <a:r>
+              <a:t> </a:t>
+            </a:r>
+            <a:r>
+              <a:rPr b="0"/>
+              <a:t>Precios</a:t>
+            </a:r>
+          </a:p>
+          <a:p>
+            <a:pPr algn="ctr">
+              <a:defRPr b="1" sz="2000"/>
+            </a:pPr>
+            <a:r>
+              <a:t>€ 35 - € 1.850</a:t>
+            </a:r>
+          </a:p>
+        </p:txBody>
+      </p:sp>
+      <p:pic>
+        <p:nvPicPr>
+          <p:cNvPr id="243" name="Imagen 6" descr="Imagen 6"/>
+          <p:cNvPicPr>
+            <a:picLocks noChangeAspect="1"/>
+          </p:cNvPicPr>
+          <p:nvPr/>
+        </p:nvPicPr>
+        <p:blipFill>
+          <a:blip r:embed="rId4">
+            <a:extLst/>
+          </a:blip>
+          <a:srcRect l="0" t="10535" r="0" b="13365"/>
+          <a:stretch>
+            <a:fillRect/>
+          </a:stretch>
+        </p:blipFill>
+        <p:spPr>
+          <a:xfrm>
+            <a:off x="8249232" y="635154"/>
+            <a:ext cx="1005181" cy="764934"/>
+          </a:xfrm>
+          <a:prstGeom prst="rect">
+            <a:avLst/>
+          </a:prstGeom>
+          <a:ln w="12700">
+            <a:miter lim="400000"/>
+          </a:ln>
+        </p:spPr>
+      </p:pic>
+      <p:pic>
+        <p:nvPicPr>
+          <p:cNvPr id="244" name="Imagen 1" descr="Imagen 1"/>
+          <p:cNvPicPr>
+            <a:picLocks noChangeAspect="1"/>
+          </p:cNvPicPr>
+          <p:nvPr/>
+        </p:nvPicPr>
+        <p:blipFill>
+          <a:blip r:embed="rId5">
+            <a:extLst/>
+          </a:blip>
+          <a:stretch>
+            <a:fillRect/>
+          </a:stretch>
+        </p:blipFill>
+        <p:spPr>
+          <a:xfrm>
+            <a:off x="860889" y="2712191"/>
+            <a:ext cx="10100280" cy="3695468"/>
+          </a:xfrm>
+          <a:prstGeom prst="rect">
+            <a:avLst/>
+          </a:prstGeom>
+          <a:ln w="12700">
+            <a:miter lim="400000"/>
+          </a:ln>
+        </p:spPr>
+      </p:pic>
+      <p:pic>
+        <p:nvPicPr>
+          <p:cNvPr id="245" name="Imagen" descr="Imagen"/>
+          <p:cNvPicPr>
+            <a:picLocks noChangeAspect="1"/>
+          </p:cNvPicPr>
+          <p:nvPr/>
+        </p:nvPicPr>
+        <p:blipFill>
+          <a:blip r:embed="rId6">
+            <a:extLst/>
+          </a:blip>
+          <a:stretch>
+            <a:fillRect/>
+          </a:stretch>
+        </p:blipFill>
+        <p:spPr>
+          <a:xfrm>
+            <a:off x="8215431" y="1646275"/>
+            <a:ext cx="1072888" cy="800602"/>
+          </a:xfrm>
+          <a:prstGeom prst="rect">
+            <a:avLst/>
+          </a:prstGeom>
+          <a:ln w="12700">
+            <a:miter lim="400000"/>
+          </a:ln>
+        </p:spPr>
+      </p:pic>
+      <p:sp>
+        <p:nvSpPr>
+          <p:cNvPr id="246" name="Google Shape;176;p29"/>
+          <p:cNvSpPr txBox="1"/>
+          <p:nvPr/>
+        </p:nvSpPr>
+        <p:spPr>
+          <a:xfrm>
+            <a:off x="9286230" y="1758630"/>
+            <a:ext cx="1651895" cy="575891"/>
+          </a:xfrm>
+          <a:prstGeom prst="rect">
+            <a:avLst/>
+          </a:prstGeom>
+          <a:ln w="12700">
+            <a:miter lim="400000"/>
+          </a:ln>
+          <a:extLst>
+            <a:ext uri="{C572A759-6A51-4108-AA02-DFA0A04FC94B}">
+              <ma14:wrappingTextBoxFlag xmlns:ma14="http://schemas.microsoft.com/office/mac/drawingml/2011/main" val="1"/>
+            </a:ext>
+          </a:extLst>
+        </p:spPr>
+        <p:txBody>
+          <a:bodyPr lIns="0" tIns="0" rIns="0" bIns="0" anchor="ctr">
+            <a:spAutoFit/>
+          </a:bodyPr>
+          <a:lstStyle/>
+          <a:p>
+            <a:pPr algn="ctr">
+              <a:defRPr b="1" sz="2000"/>
+            </a:pPr>
+            <a:r>
+              <a:t>Atributos</a:t>
+            </a:r>
+          </a:p>
+          <a:p>
+            <a:pPr algn="ctr">
+              <a:defRPr b="1" sz="2000"/>
+            </a:pPr>
+            <a:r>
+              <a:t>17 </a:t>
             </a:r>
           </a:p>
         </p:txBody>
@@ -7075,14 +7031,53 @@
       </p:grpSpPr>
       <p:sp>
         <p:nvSpPr>
-          <p:cNvPr id="240" name="Google Shape;176;p29"/>
+          <p:cNvPr id="248" name="Google Shape;202;p31"/>
+          <p:cNvSpPr txBox="1"/>
+          <p:nvPr>
+            <p:ph type="sldNum" sz="quarter" idx="4294967295"/>
+          </p:nvPr>
+        </p:nvSpPr>
+        <p:spPr>
+          <a:xfrm>
+            <a:off x="11506202" y="6554423"/>
+            <a:ext cx="127001" cy="135546"/>
+          </a:xfrm>
+          <a:prstGeom prst="rect">
+            <a:avLst/>
+          </a:prstGeom>
+          <a:extLst>
+            <a:ext uri="{C572A759-6A51-4108-AA02-DFA0A04FC94B}">
+              <ma14:wrappingTextBoxFlag xmlns:ma14="http://schemas.microsoft.com/office/mac/drawingml/2011/main" val="1"/>
+            </a:ext>
+          </a:extLst>
+        </p:spPr>
+        <p:txBody>
+          <a:bodyPr lIns="0" tIns="0" rIns="0" bIns="0"/>
+          <a:lstStyle>
+            <a:lvl1pPr algn="l">
+              <a:defRPr sz="1000">
+                <a:solidFill>
+                  <a:srgbClr val="000000"/>
+                </a:solidFill>
+              </a:defRPr>
+            </a:lvl1pPr>
+          </a:lstStyle>
+          <a:p>
+            <a:pPr/>
+            <a:fld id="{86CB4B4D-7CA3-9044-876B-883B54F8677D}" type="slidenum"/>
+          </a:p>
+        </p:txBody>
+      </p:sp>
+      <p:sp>
+        <p:nvSpPr>
+          <p:cNvPr id="249" name="Google Shape;203;p31"/>
           <p:cNvSpPr txBox="1"/>
           <p:nvPr/>
         </p:nvSpPr>
         <p:spPr>
           <a:xfrm>
-            <a:off x="5367510" y="829757"/>
-            <a:ext cx="2564654" cy="575892"/>
+            <a:off x="1108835" y="1004090"/>
+            <a:ext cx="2937378" cy="722214"/>
           </a:xfrm>
           <a:prstGeom prst="rect">
             <a:avLst/>
@@ -7097,43 +7092,44 @@
           </a:extLst>
         </p:spPr>
         <p:txBody>
-          <a:bodyPr lIns="0" tIns="0" rIns="0" bIns="0" anchor="ctr">
+          <a:bodyPr lIns="0" tIns="0" rIns="0" bIns="0">
             <a:spAutoFit/>
           </a:bodyPr>
           <a:lstStyle/>
           <a:p>
-            <a:pPr algn="ctr">
-              <a:defRPr b="1" sz="2000"/>
+            <a:pPr>
+              <a:lnSpc>
+                <a:spcPct val="80000"/>
+              </a:lnSpc>
+              <a:defRPr b="1" sz="2800"/>
             </a:pPr>
             <a:r>
-              <a:t>Cantidad </a:t>
-            </a:r>
-            <a:r>
-              <a:rPr b="0"/>
-              <a:t>de Locales</a:t>
-            </a:r>
-            <a:endParaRPr sz="3000"/>
-          </a:p>
-          <a:p>
-            <a:pPr algn="ctr">
-              <a:defRPr b="1" sz="2000"/>
+              <a:t>ATRIBUTOS</a:t>
+            </a:r>
+          </a:p>
+          <a:p>
+            <a:pPr>
+              <a:lnSpc>
+                <a:spcPct val="80000"/>
+              </a:lnSpc>
+              <a:defRPr sz="2800"/>
             </a:pPr>
             <a:r>
-              <a:t>41.714</a:t>
-            </a:r>
-          </a:p>
-        </p:txBody>
-      </p:sp>
-      <p:sp>
-        <p:nvSpPr>
-          <p:cNvPr id="241" name="Google Shape;182;p29"/>
+              <a:t>VS PRECIO</a:t>
+            </a:r>
+          </a:p>
+        </p:txBody>
+      </p:sp>
+      <p:sp>
+        <p:nvSpPr>
+          <p:cNvPr id="250" name="Google Shape;204;p31"/>
           <p:cNvSpPr txBox="1"/>
           <p:nvPr/>
         </p:nvSpPr>
         <p:spPr>
           <a:xfrm>
-            <a:off x="1055765" y="1080971"/>
-            <a:ext cx="2957679" cy="722214"/>
+            <a:off x="4172846" y="769956"/>
+            <a:ext cx="7469204" cy="1190482"/>
           </a:xfrm>
           <a:prstGeom prst="rect">
             <a:avLst/>
@@ -7148,30 +7144,161 @@
           </a:extLst>
         </p:spPr>
         <p:txBody>
-          <a:bodyPr lIns="0" tIns="0" rIns="0" bIns="0">
+          <a:bodyPr lIns="45699" tIns="45699" rIns="45699" bIns="45699">
             <a:spAutoFit/>
           </a:bodyPr>
           <a:lstStyle/>
           <a:p>
-            <a:pPr algn="ctr">
-              <a:lnSpc>
-                <a:spcPct val="80000"/>
-              </a:lnSpc>
-              <a:defRPr b="1" sz="2800"/>
+            <a:pPr>
+              <a:defRPr b="1" sz="2000"/>
             </a:pPr>
             <a:r>
-              <a:t>DATOS </a:t>
-            </a:r>
-            <a:r>
-              <a:rPr b="0"/>
-              <a:t>DE ALQUILER</a:t>
+              <a:t>¿Qué atributos son los que mejor correlacionan con perico?</a:t>
+            </a:r>
+          </a:p>
+          <a:p>
+            <a:pPr/>
+            <a:r>
+              <a:t>Para determinar esta información, usaremos un gráfico que identifica la correlación de las variables independientes (capacidad del local, cantidad de habitaciones, distancia al centro de la ciudad, cercanía a atracciones turísticas y a restaurantes) con la variables dependiente en estudio, en este caso, el precio de alquiler.</a:t>
+            </a:r>
+          </a:p>
+        </p:txBody>
+      </p:sp>
+      <p:sp>
+        <p:nvSpPr>
+          <p:cNvPr id="251" name="Google Shape;205;p31"/>
+          <p:cNvSpPr txBox="1"/>
+          <p:nvPr/>
+        </p:nvSpPr>
+        <p:spPr>
+          <a:xfrm>
+            <a:off x="8052212" y="2875502"/>
+            <a:ext cx="674562" cy="172816"/>
+          </a:xfrm>
+          <a:prstGeom prst="rect">
+            <a:avLst/>
+          </a:prstGeom>
+          <a:ln w="12700">
+            <a:miter lim="400000"/>
+          </a:ln>
+          <a:extLst>
+            <a:ext uri="{C572A759-6A51-4108-AA02-DFA0A04FC94B}">
+              <ma14:wrappingTextBoxFlag xmlns:ma14="http://schemas.microsoft.com/office/mac/drawingml/2011/main" val="1"/>
+            </a:ext>
+          </a:extLst>
+        </p:spPr>
+        <p:txBody>
+          <a:bodyPr lIns="0" tIns="0" rIns="0" bIns="0" anchor="ctr">
+            <a:spAutoFit/>
+          </a:bodyPr>
+          <a:lstStyle>
+            <a:lvl1pPr algn="ctr">
+              <a:defRPr b="1" sz="1200">
+                <a:solidFill>
+                  <a:srgbClr val="FFFFFF"/>
+                </a:solidFill>
+              </a:defRPr>
+            </a:lvl1pPr>
+          </a:lstStyle>
+          <a:p>
+            <a:pPr/>
+            <a:r>
+              <a:t>47%</a:t>
+            </a:r>
+          </a:p>
+        </p:txBody>
+      </p:sp>
+      <p:sp>
+        <p:nvSpPr>
+          <p:cNvPr id="252" name="Google Shape;206;p31"/>
+          <p:cNvSpPr txBox="1"/>
+          <p:nvPr/>
+        </p:nvSpPr>
+        <p:spPr>
+          <a:xfrm>
+            <a:off x="8052212" y="4132241"/>
+            <a:ext cx="674562" cy="172815"/>
+          </a:xfrm>
+          <a:prstGeom prst="rect">
+            <a:avLst/>
+          </a:prstGeom>
+          <a:ln w="12700">
+            <a:miter lim="400000"/>
+          </a:ln>
+          <a:extLst>
+            <a:ext uri="{C572A759-6A51-4108-AA02-DFA0A04FC94B}">
+              <ma14:wrappingTextBoxFlag xmlns:ma14="http://schemas.microsoft.com/office/mac/drawingml/2011/main" val="1"/>
+            </a:ext>
+          </a:extLst>
+        </p:spPr>
+        <p:txBody>
+          <a:bodyPr lIns="0" tIns="0" rIns="0" bIns="0" anchor="ctr">
+            <a:spAutoFit/>
+          </a:bodyPr>
+          <a:lstStyle>
+            <a:lvl1pPr algn="ctr">
+              <a:defRPr b="1" sz="1200">
+                <a:solidFill>
+                  <a:srgbClr val="FFFFFF"/>
+                </a:solidFill>
+              </a:defRPr>
+            </a:lvl1pPr>
+          </a:lstStyle>
+          <a:p>
+            <a:pPr/>
+            <a:r>
+              <a:t>55%</a:t>
+            </a:r>
+          </a:p>
+        </p:txBody>
+      </p:sp>
+      <p:sp>
+        <p:nvSpPr>
+          <p:cNvPr id="253" name="Google Shape;207;p31"/>
+          <p:cNvSpPr txBox="1"/>
+          <p:nvPr/>
+        </p:nvSpPr>
+        <p:spPr>
+          <a:xfrm>
+            <a:off x="8052212" y="5341613"/>
+            <a:ext cx="674562" cy="172815"/>
+          </a:xfrm>
+          <a:prstGeom prst="rect">
+            <a:avLst/>
+          </a:prstGeom>
+          <a:ln w="12700">
+            <a:miter lim="400000"/>
+          </a:ln>
+          <a:extLst>
+            <a:ext uri="{C572A759-6A51-4108-AA02-DFA0A04FC94B}">
+              <ma14:wrappingTextBoxFlag xmlns:ma14="http://schemas.microsoft.com/office/mac/drawingml/2011/main" val="1"/>
+            </a:ext>
+          </a:extLst>
+        </p:spPr>
+        <p:txBody>
+          <a:bodyPr lIns="0" tIns="0" rIns="0" bIns="0" anchor="ctr">
+            <a:spAutoFit/>
+          </a:bodyPr>
+          <a:lstStyle>
+            <a:lvl1pPr algn="ctr">
+              <a:defRPr b="1" sz="1200">
+                <a:solidFill>
+                  <a:srgbClr val="FFFFFF"/>
+                </a:solidFill>
+              </a:defRPr>
+            </a:lvl1pPr>
+          </a:lstStyle>
+          <a:p>
+            <a:pPr/>
+            <a:r>
+              <a:t>52%</a:t>
             </a:r>
           </a:p>
         </p:txBody>
       </p:sp>
       <p:pic>
         <p:nvPicPr>
-          <p:cNvPr id="242" name="Imagen 4" descr="Imagen 4"/>
+          <p:cNvPr id="254" name="Imagen 1" descr="Imagen 1"/>
           <p:cNvPicPr>
             <a:picLocks noChangeAspect="1"/>
           </p:cNvPicPr>
@@ -7187,8 +7314,8 @@
         </p:blipFill>
         <p:spPr>
           <a:xfrm>
-            <a:off x="4342018" y="575413"/>
-            <a:ext cx="1072887" cy="967110"/>
+            <a:off x="3180538" y="2345607"/>
+            <a:ext cx="8495388" cy="3746083"/>
           </a:xfrm>
           <a:prstGeom prst="rect">
             <a:avLst/>
@@ -7198,45 +7325,16 @@
           </a:ln>
         </p:spPr>
       </p:pic>
-      <p:pic>
-        <p:nvPicPr>
-          <p:cNvPr id="243" name="Imagen 5" descr="Imagen 5"/>
-          <p:cNvPicPr>
-            <a:picLocks noChangeAspect="1"/>
-          </p:cNvPicPr>
+      <p:sp>
+        <p:nvSpPr>
+          <p:cNvPr id="255" name="Google Shape;204;p31"/>
+          <p:cNvSpPr txBox="1"/>
           <p:nvPr/>
-        </p:nvPicPr>
-        <p:blipFill>
-          <a:blip r:embed="rId3">
-            <a:extLst/>
-          </a:blip>
-          <a:stretch>
-            <a:fillRect/>
-          </a:stretch>
-        </p:blipFill>
-        <p:spPr>
-          <a:xfrm>
-            <a:off x="4378851" y="1696102"/>
-            <a:ext cx="999220" cy="700946"/>
-          </a:xfrm>
-          <a:prstGeom prst="rect">
-            <a:avLst/>
-          </a:prstGeom>
-          <a:ln w="12700">
-            <a:miter lim="400000"/>
-          </a:ln>
-        </p:spPr>
-      </p:pic>
-      <p:sp>
-        <p:nvSpPr>
-          <p:cNvPr id="244" name="Google Shape;176;p29"/>
-          <p:cNvSpPr txBox="1"/>
-          <p:nvPr/>
-        </p:nvSpPr>
-        <p:spPr>
-          <a:xfrm>
-            <a:off x="9286231" y="829757"/>
-            <a:ext cx="1651895" cy="575892"/>
+        </p:nvSpPr>
+        <p:spPr>
+          <a:xfrm>
+            <a:off x="941290" y="2580308"/>
+            <a:ext cx="2019943" cy="2117582"/>
           </a:xfrm>
           <a:prstGeom prst="rect">
             <a:avLst/>
@@ -7251,218 +7349,14 @@
           </a:extLst>
         </p:spPr>
         <p:txBody>
-          <a:bodyPr lIns="0" tIns="0" rIns="0" bIns="0" anchor="ctr">
+          <a:bodyPr lIns="45699" tIns="45699" rIns="45699" bIns="45699">
             <a:spAutoFit/>
           </a:bodyPr>
           <a:lstStyle/>
           <a:p>
-            <a:pPr algn="ctr">
-              <a:defRPr b="1" sz="2000"/>
-            </a:pPr>
-            <a:r>
-              <a:t>Ciudades</a:t>
-            </a:r>
-          </a:p>
-          <a:p>
-            <a:pPr algn="ctr">
-              <a:defRPr b="1" sz="2000"/>
-            </a:pPr>
-            <a:r>
-              <a:t>9 </a:t>
-            </a:r>
-          </a:p>
-        </p:txBody>
-      </p:sp>
-      <p:sp>
-        <p:nvSpPr>
-          <p:cNvPr id="245" name="Google Shape;176;p29"/>
-          <p:cNvSpPr txBox="1"/>
-          <p:nvPr/>
-        </p:nvSpPr>
-        <p:spPr>
-          <a:xfrm>
-            <a:off x="5394002" y="1758630"/>
-            <a:ext cx="2511671" cy="575891"/>
-          </a:xfrm>
-          <a:prstGeom prst="rect">
-            <a:avLst/>
-          </a:prstGeom>
-          <a:ln w="12700">
-            <a:miter lim="400000"/>
-          </a:ln>
-          <a:extLst>
-            <a:ext uri="{C572A759-6A51-4108-AA02-DFA0A04FC94B}">
-              <ma14:wrappingTextBoxFlag xmlns:ma14="http://schemas.microsoft.com/office/mac/drawingml/2011/main" val="1"/>
-            </a:ext>
-          </a:extLst>
-        </p:spPr>
-        <p:txBody>
-          <a:bodyPr lIns="0" tIns="0" rIns="0" bIns="0" anchor="ctr">
-            <a:spAutoFit/>
-          </a:bodyPr>
-          <a:lstStyle/>
-          <a:p>
-            <a:pPr algn="ctr">
-              <a:defRPr b="1" sz="2000"/>
-            </a:pPr>
-            <a:r>
-              <a:t>Rango</a:t>
-            </a:r>
-            <a:r>
-              <a:rPr b="0"/>
-              <a:t> de</a:t>
-            </a:r>
-            <a:r>
-              <a:t> </a:t>
-            </a:r>
-            <a:r>
-              <a:rPr b="0"/>
-              <a:t>Precios</a:t>
-            </a:r>
-          </a:p>
-          <a:p>
-            <a:pPr algn="ctr">
-              <a:defRPr b="1" sz="2000"/>
-            </a:pPr>
-            <a:r>
-              <a:t>€ 35 - € 1.850</a:t>
-            </a:r>
-          </a:p>
-        </p:txBody>
-      </p:sp>
-      <p:pic>
-        <p:nvPicPr>
-          <p:cNvPr id="246" name="Imagen 6" descr="Imagen 6"/>
-          <p:cNvPicPr>
-            <a:picLocks noChangeAspect="1"/>
-          </p:cNvPicPr>
-          <p:nvPr/>
-        </p:nvPicPr>
-        <p:blipFill>
-          <a:blip r:embed="rId4">
-            <a:extLst/>
-          </a:blip>
-          <a:srcRect l="0" t="10535" r="0" b="13365"/>
-          <a:stretch>
-            <a:fillRect/>
-          </a:stretch>
-        </p:blipFill>
-        <p:spPr>
-          <a:xfrm>
-            <a:off x="8249232" y="635155"/>
-            <a:ext cx="1005180" cy="764933"/>
-          </a:xfrm>
-          <a:prstGeom prst="rect">
-            <a:avLst/>
-          </a:prstGeom>
-          <a:ln w="12700">
-            <a:miter lim="400000"/>
-          </a:ln>
-        </p:spPr>
-      </p:pic>
-      <p:pic>
-        <p:nvPicPr>
-          <p:cNvPr id="247" name="Imagen 1" descr="Imagen 1"/>
-          <p:cNvPicPr>
-            <a:picLocks noChangeAspect="1"/>
-          </p:cNvPicPr>
-          <p:nvPr/>
-        </p:nvPicPr>
-        <p:blipFill>
-          <a:blip r:embed="rId5">
-            <a:extLst/>
-          </a:blip>
-          <a:stretch>
-            <a:fillRect/>
-          </a:stretch>
-        </p:blipFill>
-        <p:spPr>
-          <a:xfrm>
-            <a:off x="860889" y="2712191"/>
-            <a:ext cx="10100280" cy="3695467"/>
-          </a:xfrm>
-          <a:prstGeom prst="rect">
-            <a:avLst/>
-          </a:prstGeom>
-          <a:ln w="12700">
-            <a:miter lim="400000"/>
-          </a:ln>
-        </p:spPr>
-      </p:pic>
-      <p:pic>
-        <p:nvPicPr>
-          <p:cNvPr id="248" name="Imagen" descr="Imagen"/>
-          <p:cNvPicPr>
-            <a:picLocks noChangeAspect="1"/>
-          </p:cNvPicPr>
-          <p:nvPr/>
-        </p:nvPicPr>
-        <p:blipFill>
-          <a:blip r:embed="rId6">
-            <a:extLst/>
-          </a:blip>
-          <a:stretch>
-            <a:fillRect/>
-          </a:stretch>
-        </p:blipFill>
-        <p:spPr>
-          <a:xfrm>
-            <a:off x="8215431" y="1646275"/>
-            <a:ext cx="1072887" cy="800601"/>
-          </a:xfrm>
-          <a:prstGeom prst="rect">
-            <a:avLst/>
-          </a:prstGeom>
-          <a:ln w="12700">
-            <a:miter lim="400000"/>
-          </a:ln>
-        </p:spPr>
-      </p:pic>
-      <p:sp>
-        <p:nvSpPr>
-          <p:cNvPr id="249" name="Google Shape;176;p29"/>
-          <p:cNvSpPr txBox="1"/>
-          <p:nvPr/>
-        </p:nvSpPr>
-        <p:spPr>
-          <a:xfrm>
-            <a:off x="9286231" y="1758630"/>
-            <a:ext cx="1651895" cy="575891"/>
-          </a:xfrm>
-          <a:prstGeom prst="rect">
-            <a:avLst/>
-          </a:prstGeom>
-          <a:ln w="12700">
-            <a:miter lim="400000"/>
-          </a:ln>
-          <a:extLst>
-            <a:ext uri="{C572A759-6A51-4108-AA02-DFA0A04FC94B}">
-              <ma14:wrappingTextBoxFlag xmlns:ma14="http://schemas.microsoft.com/office/mac/drawingml/2011/main" val="1"/>
-            </a:ext>
-          </a:extLst>
-        </p:spPr>
-        <p:txBody>
-          <a:bodyPr lIns="0" tIns="0" rIns="0" bIns="0" anchor="ctr">
-            <a:spAutoFit/>
-          </a:bodyPr>
-          <a:lstStyle/>
-          <a:p>
-            <a:pPr algn="ctr">
-              <a:defRPr b="1" sz="2000"/>
-            </a:pPr>
-            <a:r>
-              <a:t>Atributos</a:t>
-            </a:r>
-          </a:p>
-          <a:p>
-            <a:pPr algn="ctr">
-              <a:defRPr b="1" sz="2000"/>
-            </a:pPr>
-            <a:r>
-              <a:t>17</a:t>
-            </a:r>
-            <a:r>
-              <a:t> </a:t>
+            <a:pPr/>
+            <a:r>
+              <a:t>A primera vista, la cantidad de dormitorios, la capacidad del local y la cercanía a las atracciones turísticas son los aspectos más valorados por los clientes a la hora de convalidar el precio de alquiler.</a:t>
             </a:r>
           </a:p>
         </p:txBody>
@@ -7506,7 +7400,7 @@
       </p:grpSpPr>
       <p:sp>
         <p:nvSpPr>
-          <p:cNvPr id="251" name="Google Shape;202;p31"/>
+          <p:cNvPr id="257" name="Google Shape;216;p32"/>
           <p:cNvSpPr txBox="1"/>
           <p:nvPr>
             <p:ph type="sldNum" sz="quarter" idx="4294967295"/>
@@ -7545,14 +7439,14 @@
       </p:sp>
       <p:sp>
         <p:nvSpPr>
-          <p:cNvPr id="252" name="Google Shape;203;p31"/>
+          <p:cNvPr id="258" name="Google Shape;217;p32"/>
           <p:cNvSpPr txBox="1"/>
           <p:nvPr/>
         </p:nvSpPr>
         <p:spPr>
           <a:xfrm>
-            <a:off x="1108836" y="1004090"/>
-            <a:ext cx="2937376" cy="722215"/>
+            <a:off x="867342" y="943186"/>
+            <a:ext cx="2253538" cy="722215"/>
           </a:xfrm>
           <a:prstGeom prst="rect">
             <a:avLst/>
@@ -7579,34 +7473,25 @@
               <a:defRPr sz="2800"/>
             </a:pPr>
             <a:r>
+              <a:t>PRECIO VS </a:t>
+            </a:r>
+            <a:r>
               <a:rPr b="1"/>
-              <a:t>ATRIBUTOS</a:t>
-            </a:r>
-            <a:endParaRPr b="1"/>
-          </a:p>
-          <a:p>
-            <a:pPr>
-              <a:lnSpc>
-                <a:spcPct val="80000"/>
-              </a:lnSpc>
-              <a:defRPr sz="2800"/>
-            </a:pPr>
-            <a:r>
-              <a:t>VS PRECIO</a:t>
-            </a:r>
-          </a:p>
-        </p:txBody>
-      </p:sp>
-      <p:sp>
-        <p:nvSpPr>
-          <p:cNvPr id="253" name="Google Shape;204;p31"/>
+              <a:t>TAMAÑO</a:t>
+            </a:r>
+          </a:p>
+        </p:txBody>
+      </p:sp>
+      <p:sp>
+        <p:nvSpPr>
+          <p:cNvPr id="259" name="Google Shape;218;p32"/>
           <p:cNvSpPr txBox="1"/>
           <p:nvPr/>
         </p:nvSpPr>
         <p:spPr>
           <a:xfrm>
-            <a:off x="4172846" y="769956"/>
-            <a:ext cx="7469203" cy="1190483"/>
+            <a:off x="3505537" y="607452"/>
+            <a:ext cx="8296252" cy="1393683"/>
           </a:xfrm>
           <a:prstGeom prst="rect">
             <a:avLst/>
@@ -7630,27 +7515,33 @@
               <a:defRPr b="1" sz="2000"/>
             </a:pPr>
             <a:r>
-              <a:t>¿Qué atributos son los que mejor correlacionan con perico?</a:t>
+              <a:t>¿Qué relación tiene el precio con el tamaño del local?</a:t>
             </a:r>
           </a:p>
           <a:p>
             <a:pPr/>
             <a:r>
-              <a:t>Para determinar esta información, usaremos un gráfico que identifica la correlación de las variables independientes (capacidad del local, cantidad de habitaciones, distancia al centro de la ciudad, cercanía a atracciones turísticas y a restaurantes) con la variables dependiente en estudio, en este caso, el precio de alquiler.</a:t>
-            </a:r>
-          </a:p>
-        </p:txBody>
-      </p:sp>
-      <p:sp>
-        <p:nvSpPr>
-          <p:cNvPr id="254" name="Google Shape;205;p31"/>
+              <a:t>Analizaremos cómo varía el precio en función de la cantidad de dormitorios y la capacidad el local (cuántas personas pueden dormir en el departamento en alquiler).</a:t>
+            </a:r>
+          </a:p>
+          <a:p>
+            <a:pPr/>
+            <a:r>
+              <a:t>Puede verse que los valores de alquiler aumentan a medida que la cantidad de dormitorios es mayor, como así también a medida que el local aumenta su capacidad (un local con 6 camas tiene mayor valor que uno con 2 camas).</a:t>
+            </a:r>
+          </a:p>
+        </p:txBody>
+      </p:sp>
+      <p:sp>
+        <p:nvSpPr>
+          <p:cNvPr id="260" name="Google Shape;219;p32"/>
           <p:cNvSpPr txBox="1"/>
           <p:nvPr/>
         </p:nvSpPr>
         <p:spPr>
           <a:xfrm>
-            <a:off x="8052212" y="2875503"/>
-            <a:ext cx="674561" cy="172816"/>
+            <a:off x="8109774" y="3042232"/>
+            <a:ext cx="674562" cy="172816"/>
           </a:xfrm>
           <a:prstGeom prst="rect">
             <a:avLst/>
@@ -7687,14 +7578,14 @@
       </p:sp>
       <p:sp>
         <p:nvSpPr>
-          <p:cNvPr id="255" name="Google Shape;206;p31"/>
+          <p:cNvPr id="261" name="Google Shape;220;p32"/>
           <p:cNvSpPr txBox="1"/>
           <p:nvPr/>
         </p:nvSpPr>
         <p:spPr>
           <a:xfrm>
-            <a:off x="8052212" y="4132241"/>
-            <a:ext cx="674561" cy="172815"/>
+            <a:off x="8109774" y="4298970"/>
+            <a:ext cx="674562" cy="172815"/>
           </a:xfrm>
           <a:prstGeom prst="rect">
             <a:avLst/>
@@ -7729,53 +7620,9 @@
           </a:p>
         </p:txBody>
       </p:sp>
-      <p:sp>
-        <p:nvSpPr>
-          <p:cNvPr id="256" name="Google Shape;207;p31"/>
-          <p:cNvSpPr txBox="1"/>
-          <p:nvPr/>
-        </p:nvSpPr>
-        <p:spPr>
-          <a:xfrm>
-            <a:off x="8052212" y="5341613"/>
-            <a:ext cx="674561" cy="172815"/>
-          </a:xfrm>
-          <a:prstGeom prst="rect">
-            <a:avLst/>
-          </a:prstGeom>
-          <a:ln w="12700">
-            <a:miter lim="400000"/>
-          </a:ln>
-          <a:extLst>
-            <a:ext uri="{C572A759-6A51-4108-AA02-DFA0A04FC94B}">
-              <ma14:wrappingTextBoxFlag xmlns:ma14="http://schemas.microsoft.com/office/mac/drawingml/2011/main" val="1"/>
-            </a:ext>
-          </a:extLst>
-        </p:spPr>
-        <p:txBody>
-          <a:bodyPr lIns="0" tIns="0" rIns="0" bIns="0" anchor="ctr">
-            <a:spAutoFit/>
-          </a:bodyPr>
-          <a:lstStyle>
-            <a:lvl1pPr algn="ctr">
-              <a:defRPr b="1" sz="1200">
-                <a:solidFill>
-                  <a:srgbClr val="FFFFFF"/>
-                </a:solidFill>
-              </a:defRPr>
-            </a:lvl1pPr>
-          </a:lstStyle>
-          <a:p>
-            <a:pPr/>
-            <a:r>
-              <a:t>52%</a:t>
-            </a:r>
-          </a:p>
-        </p:txBody>
-      </p:sp>
       <p:pic>
         <p:nvPicPr>
-          <p:cNvPr id="257" name="Imagen 1" descr="Imagen 1"/>
+          <p:cNvPr id="262" name="Imagen 1" descr="Imagen 1"/>
           <p:cNvPicPr>
             <a:picLocks noChangeAspect="1"/>
           </p:cNvPicPr>
@@ -7791,8 +7638,8 @@
         </p:blipFill>
         <p:spPr>
           <a:xfrm>
-            <a:off x="3180538" y="2345607"/>
-            <a:ext cx="8495388" cy="3746083"/>
+            <a:off x="522287" y="2305313"/>
+            <a:ext cx="11147426" cy="3656433"/>
           </a:xfrm>
           <a:prstGeom prst="rect">
             <a:avLst/>
@@ -7802,42 +7649,6 @@
           </a:ln>
         </p:spPr>
       </p:pic>
-      <p:sp>
-        <p:nvSpPr>
-          <p:cNvPr id="258" name="Google Shape;204;p31"/>
-          <p:cNvSpPr txBox="1"/>
-          <p:nvPr/>
-        </p:nvSpPr>
-        <p:spPr>
-          <a:xfrm>
-            <a:off x="941290" y="2580308"/>
-            <a:ext cx="2019942" cy="2117582"/>
-          </a:xfrm>
-          <a:prstGeom prst="rect">
-            <a:avLst/>
-          </a:prstGeom>
-          <a:ln w="12700">
-            <a:miter lim="400000"/>
-          </a:ln>
-          <a:extLst>
-            <a:ext uri="{C572A759-6A51-4108-AA02-DFA0A04FC94B}">
-              <ma14:wrappingTextBoxFlag xmlns:ma14="http://schemas.microsoft.com/office/mac/drawingml/2011/main" val="1"/>
-            </a:ext>
-          </a:extLst>
-        </p:spPr>
-        <p:txBody>
-          <a:bodyPr lIns="45699" tIns="45699" rIns="45699" bIns="45699">
-            <a:spAutoFit/>
-          </a:bodyPr>
-          <a:lstStyle/>
-          <a:p>
-            <a:pPr/>
-            <a:r>
-              <a:t>A primera vista, la cantidad de dormitorios, la capacidad del local y la cercanía a las atracciones turísticas son los aspectos más valorados por los clientes a la hora de convalidar el precio de alquiler.</a:t>
-            </a:r>
-          </a:p>
-        </p:txBody>
-      </p:sp>
     </p:spTree>
   </p:cSld>
   <p:clrMapOvr>
@@ -7877,7 +7688,7 @@
       </p:grpSpPr>
       <p:sp>
         <p:nvSpPr>
-          <p:cNvPr id="260" name="Google Shape;216;p32"/>
+          <p:cNvPr id="264" name="Google Shape;232;p33"/>
           <p:cNvSpPr txBox="1"/>
           <p:nvPr>
             <p:ph type="sldNum" sz="quarter" idx="4294967295"/>
@@ -7916,14 +7727,14 @@
       </p:sp>
       <p:sp>
         <p:nvSpPr>
-          <p:cNvPr id="261" name="Google Shape;217;p32"/>
+          <p:cNvPr id="265" name="Google Shape;233;p33"/>
           <p:cNvSpPr txBox="1"/>
           <p:nvPr/>
         </p:nvSpPr>
         <p:spPr>
           <a:xfrm>
-            <a:off x="867343" y="943187"/>
-            <a:ext cx="2253536" cy="722214"/>
+            <a:off x="1014050" y="853447"/>
+            <a:ext cx="2096238" cy="722215"/>
           </a:xfrm>
           <a:prstGeom prst="rect">
             <a:avLst/>
@@ -7954,21 +7765,21 @@
             </a:r>
             <a:r>
               <a:rPr b="1"/>
-              <a:t>TAMAÑO</a:t>
-            </a:r>
-          </a:p>
-        </p:txBody>
-      </p:sp>
-      <p:sp>
-        <p:nvSpPr>
-          <p:cNvPr id="262" name="Google Shape;218;p32"/>
+              <a:t>CIUDAD</a:t>
+            </a:r>
+          </a:p>
+        </p:txBody>
+      </p:sp>
+      <p:sp>
+        <p:nvSpPr>
+          <p:cNvPr id="266" name="Google Shape;234;p33"/>
           <p:cNvSpPr txBox="1"/>
           <p:nvPr/>
         </p:nvSpPr>
         <p:spPr>
           <a:xfrm>
-            <a:off x="3505537" y="607453"/>
-            <a:ext cx="8296252" cy="1393682"/>
+            <a:off x="3497984" y="739756"/>
+            <a:ext cx="7179310" cy="759097"/>
           </a:xfrm>
           <a:prstGeom prst="rect">
             <a:avLst/>
@@ -7992,114 +7803,22 @@
               <a:defRPr b="1" sz="2000"/>
             </a:pPr>
             <a:r>
-              <a:t>¿Qué relación tiene el precio con el tamaño del local?</a:t>
-            </a:r>
-          </a:p>
-          <a:p>
-            <a:pPr/>
-            <a:r>
-              <a:t>Analizaremos cómo varía el precio en función de la cantidad de dormitorios y la capacidad el local (cuántas personas pueden dormir en el departamento en alquiler).</a:t>
-            </a:r>
-          </a:p>
-          <a:p>
-            <a:pPr/>
-            <a:r>
-              <a:t>Puede verse que los valores de alquiler aumentan a medida que la cantidad de dormitorios es mayor, como así también a medida que el local aumenta su capacidad (un local con 6 camas tiene mayor valor que uno con 2 camas).</a:t>
-            </a:r>
-          </a:p>
-        </p:txBody>
-      </p:sp>
-      <p:sp>
-        <p:nvSpPr>
-          <p:cNvPr id="263" name="Google Shape;219;p32"/>
-          <p:cNvSpPr txBox="1"/>
-          <p:nvPr/>
-        </p:nvSpPr>
-        <p:spPr>
-          <a:xfrm>
-            <a:off x="8109775" y="3042233"/>
-            <a:ext cx="674561" cy="172815"/>
-          </a:xfrm>
-          <a:prstGeom prst="rect">
-            <a:avLst/>
-          </a:prstGeom>
-          <a:ln w="12700">
-            <a:miter lim="400000"/>
-          </a:ln>
-          <a:extLst>
-            <a:ext uri="{C572A759-6A51-4108-AA02-DFA0A04FC94B}">
-              <ma14:wrappingTextBoxFlag xmlns:ma14="http://schemas.microsoft.com/office/mac/drawingml/2011/main" val="1"/>
-            </a:ext>
-          </a:extLst>
-        </p:spPr>
-        <p:txBody>
-          <a:bodyPr lIns="0" tIns="0" rIns="0" bIns="0" anchor="ctr">
-            <a:spAutoFit/>
-          </a:bodyPr>
-          <a:lstStyle>
-            <a:lvl1pPr algn="ctr">
-              <a:defRPr b="1" sz="1200">
-                <a:solidFill>
-                  <a:srgbClr val="FFFFFF"/>
-                </a:solidFill>
-              </a:defRPr>
-            </a:lvl1pPr>
-          </a:lstStyle>
-          <a:p>
-            <a:pPr/>
-            <a:r>
-              <a:t>47%</a:t>
-            </a:r>
-          </a:p>
-        </p:txBody>
-      </p:sp>
-      <p:sp>
-        <p:nvSpPr>
-          <p:cNvPr id="264" name="Google Shape;220;p32"/>
-          <p:cNvSpPr txBox="1"/>
-          <p:nvPr/>
-        </p:nvSpPr>
-        <p:spPr>
-          <a:xfrm>
-            <a:off x="8109775" y="4298970"/>
-            <a:ext cx="674561" cy="172815"/>
-          </a:xfrm>
-          <a:prstGeom prst="rect">
-            <a:avLst/>
-          </a:prstGeom>
-          <a:ln w="12700">
-            <a:miter lim="400000"/>
-          </a:ln>
-          <a:extLst>
-            <a:ext uri="{C572A759-6A51-4108-AA02-DFA0A04FC94B}">
-              <ma14:wrappingTextBoxFlag xmlns:ma14="http://schemas.microsoft.com/office/mac/drawingml/2011/main" val="1"/>
-            </a:ext>
-          </a:extLst>
-        </p:spPr>
-        <p:txBody>
-          <a:bodyPr lIns="0" tIns="0" rIns="0" bIns="0" anchor="ctr">
-            <a:spAutoFit/>
-          </a:bodyPr>
-          <a:lstStyle>
-            <a:lvl1pPr algn="ctr">
-              <a:defRPr b="1" sz="1200">
-                <a:solidFill>
-                  <a:srgbClr val="FFFFFF"/>
-                </a:solidFill>
-              </a:defRPr>
-            </a:lvl1pPr>
-          </a:lstStyle>
-          <a:p>
-            <a:pPr/>
-            <a:r>
-              <a:t>55%</a:t>
+              <a:t>¿Varía el precio de alquiler en función de la ciudad?</a:t>
+            </a:r>
+          </a:p>
+          <a:p>
+            <a:pPr>
+              <a:defRPr sz="1300"/>
+            </a:pPr>
+            <a:r>
+              <a:t>Podemos ver que la ciudad con mayor precio de alquiler promedio es Amsterdam, seguida por París. Las ciudades más baratas para alquilar son Atenas, Budapest y ROMA.</a:t>
             </a:r>
           </a:p>
         </p:txBody>
       </p:sp>
       <p:pic>
         <p:nvPicPr>
-          <p:cNvPr id="265" name="Imagen 1" descr="Imagen 1"/>
+          <p:cNvPr id="267" name="Imagen" descr="Imagen"/>
           <p:cNvPicPr>
             <a:picLocks noChangeAspect="1"/>
           </p:cNvPicPr>
@@ -8115,8 +7834,8 @@
         </p:blipFill>
         <p:spPr>
           <a:xfrm>
-            <a:off x="522287" y="2305314"/>
-            <a:ext cx="11147426" cy="3656432"/>
+            <a:off x="512472" y="1752290"/>
+            <a:ext cx="11167057" cy="4344598"/>
           </a:xfrm>
           <a:prstGeom prst="rect">
             <a:avLst/>
@@ -8165,7 +7884,7 @@
       </p:grpSpPr>
       <p:sp>
         <p:nvSpPr>
-          <p:cNvPr id="267" name="Google Shape;232;p33"/>
+          <p:cNvPr id="269" name="Google Shape;232;p33"/>
           <p:cNvSpPr txBox="1"/>
           <p:nvPr>
             <p:ph type="sldNum" sz="quarter" idx="4294967295"/>
@@ -8173,7 +7892,7 @@
         </p:nvSpPr>
         <p:spPr>
           <a:xfrm>
-            <a:off x="11506202" y="6554423"/>
+            <a:off x="11506202" y="6554424"/>
             <a:ext cx="127001" cy="135546"/>
           </a:xfrm>
           <a:prstGeom prst="rect">
@@ -8204,14 +7923,14 @@
       </p:sp>
       <p:sp>
         <p:nvSpPr>
-          <p:cNvPr id="268" name="Google Shape;233;p33"/>
+          <p:cNvPr id="270" name="Google Shape;233;p33"/>
           <p:cNvSpPr txBox="1"/>
           <p:nvPr/>
         </p:nvSpPr>
         <p:spPr>
           <a:xfrm>
-            <a:off x="1014050" y="853448"/>
-            <a:ext cx="2096239" cy="722214"/>
+            <a:off x="1014050" y="830087"/>
+            <a:ext cx="2847872" cy="722214"/>
           </a:xfrm>
           <a:prstGeom prst="rect">
             <a:avLst/>
@@ -8242,21 +7961,21 @@
             </a:r>
             <a:r>
               <a:rPr b="1"/>
-              <a:t>CIUDAD</a:t>
-            </a:r>
-          </a:p>
-        </p:txBody>
-      </p:sp>
-      <p:sp>
-        <p:nvSpPr>
-          <p:cNvPr id="269" name="Google Shape;234;p33"/>
+              <a:t>ATRACCIONES</a:t>
+            </a:r>
+          </a:p>
+        </p:txBody>
+      </p:sp>
+      <p:sp>
+        <p:nvSpPr>
+          <p:cNvPr id="271" name="Google Shape;234;p33"/>
           <p:cNvSpPr txBox="1"/>
           <p:nvPr/>
         </p:nvSpPr>
         <p:spPr>
           <a:xfrm>
-            <a:off x="3497985" y="739756"/>
-            <a:ext cx="7179309" cy="759098"/>
+            <a:off x="4114101" y="716394"/>
+            <a:ext cx="7327877" cy="949598"/>
           </a:xfrm>
           <a:prstGeom prst="rect">
             <a:avLst/>
@@ -8280,7 +7999,7 @@
               <a:defRPr b="1" sz="2000"/>
             </a:pPr>
             <a:r>
-              <a:t>¿Varía el precio de alquiler en función de la ciudad?</a:t>
+              <a:t>¿Cómo afecta la cercanía a atracciones al precio?</a:t>
             </a:r>
           </a:p>
           <a:p>
@@ -8288,14 +8007,14 @@
               <a:defRPr sz="1300"/>
             </a:pPr>
             <a:r>
-              <a:t>Podemos ver que la ciudad con mayor precio de alquiler promedio es Amsterdam, seguida por París. Las ciudades más baratas para alquilar son Atenas, Budapest y ROMA.</a:t>
+              <a:t>En los gráficos no puede observarse claramente que haya una relación directa entre distancia a atracciones o locales de comida y el precio de alquiler. Sin embargo, puede verse que a medida de que nos alejamos de esas atracciones turísticas, el precio máximo de alquiler tiende a bajar.</a:t>
             </a:r>
           </a:p>
         </p:txBody>
       </p:sp>
       <p:pic>
         <p:nvPicPr>
-          <p:cNvPr id="270" name="Imagen" descr="Imagen"/>
+          <p:cNvPr id="272" name="Imagen" descr="Imagen"/>
           <p:cNvPicPr>
             <a:picLocks noChangeAspect="1"/>
           </p:cNvPicPr>
@@ -8311,8 +8030,8 @@
         </p:blipFill>
         <p:spPr>
           <a:xfrm>
-            <a:off x="512472" y="1752291"/>
-            <a:ext cx="11167056" cy="4344597"/>
+            <a:off x="419043" y="2134666"/>
+            <a:ext cx="11116945" cy="3646433"/>
           </a:xfrm>
           <a:prstGeom prst="rect">
             <a:avLst/>

</xml_diff>